<commit_message>
Änderungen an Vor und Nachteilen und weitere kleinere Anpassungen
</commit_message>
<xml_diff>
--- a/Präsentation_Seminararbeit.pptx
+++ b/Präsentation_Seminararbeit.pptx
@@ -5,10 +5,10 @@
     <p:sldMasterId id="2147483650" r:id="rId1"/>
   </p:sldMasterIdLst>
   <p:notesMasterIdLst>
-    <p:notesMasterId r:id="rId50"/>
+    <p:notesMasterId r:id="rId52"/>
   </p:notesMasterIdLst>
   <p:handoutMasterIdLst>
-    <p:handoutMasterId r:id="rId51"/>
+    <p:handoutMasterId r:id="rId53"/>
   </p:handoutMasterIdLst>
   <p:sldIdLst>
     <p:sldId id="259" r:id="rId2"/>
@@ -45,20 +45,22 @@
     <p:sldId id="370" r:id="rId33"/>
     <p:sldId id="369" r:id="rId34"/>
     <p:sldId id="368" r:id="rId35"/>
-    <p:sldId id="367" r:id="rId36"/>
-    <p:sldId id="366" r:id="rId37"/>
-    <p:sldId id="337" r:id="rId38"/>
-    <p:sldId id="334" r:id="rId39"/>
-    <p:sldId id="335" r:id="rId40"/>
-    <p:sldId id="336" r:id="rId41"/>
-    <p:sldId id="386" r:id="rId42"/>
-    <p:sldId id="338" r:id="rId43"/>
-    <p:sldId id="339" r:id="rId44"/>
-    <p:sldId id="350" r:id="rId45"/>
-    <p:sldId id="351" r:id="rId46"/>
-    <p:sldId id="352" r:id="rId47"/>
-    <p:sldId id="353" r:id="rId48"/>
-    <p:sldId id="355" r:id="rId49"/>
+    <p:sldId id="388" r:id="rId36"/>
+    <p:sldId id="367" r:id="rId37"/>
+    <p:sldId id="366" r:id="rId38"/>
+    <p:sldId id="337" r:id="rId39"/>
+    <p:sldId id="334" r:id="rId40"/>
+    <p:sldId id="335" r:id="rId41"/>
+    <p:sldId id="387" r:id="rId42"/>
+    <p:sldId id="336" r:id="rId43"/>
+    <p:sldId id="386" r:id="rId44"/>
+    <p:sldId id="338" r:id="rId45"/>
+    <p:sldId id="339" r:id="rId46"/>
+    <p:sldId id="350" r:id="rId47"/>
+    <p:sldId id="351" r:id="rId48"/>
+    <p:sldId id="352" r:id="rId49"/>
+    <p:sldId id="353" r:id="rId50"/>
+    <p:sldId id="355" r:id="rId51"/>
   </p:sldIdLst>
   <p:sldSz cx="9501188" cy="7021513"/>
   <p:notesSz cx="6724650" cy="9774238"/>
@@ -5307,61 +5309,47 @@
           <a:bodyPr/>
           <a:lstStyle/>
           <a:p>
-            <a:pPr marL="0" indent="0">
-              <a:buFontTx/>
-              <a:buNone/>
-            </a:pPr>
+            <a:r>
+              <a:rPr lang="de-DE" dirty="0"/>
+              <a:t>Kann</a:t>
+            </a:r>
             <a:r>
               <a:rPr lang="de-DE" baseline="0" dirty="0"/>
-              <a:t>Der Unterschied:</a:t>
-            </a:r>
-          </a:p>
-          <a:p>
-            <a:pPr marL="171450" indent="-171450">
-              <a:buFontTx/>
-              <a:buChar char="-"/>
-            </a:pPr>
+              <a:t> aus Zeitgründen nicht überall drauf eingehen</a:t>
+            </a:r>
+          </a:p>
+          <a:p>
             <a:r>
               <a:rPr lang="de-DE" baseline="0" dirty="0"/>
-              <a:t>SVN hält nur die aktuellen Versionen der Dateien im WD vor</a:t>
-            </a:r>
-          </a:p>
-          <a:p>
-            <a:pPr marL="171450" indent="-171450">
-              <a:buFontTx/>
-              <a:buChar char="-"/>
-            </a:pPr>
-            <a:r>
-              <a:rPr lang="de-DE" baseline="0" dirty="0"/>
-              <a:t>Git hält alle Versionen lokal</a:t>
-            </a:r>
-          </a:p>
-          <a:p>
-            <a:pPr marL="171450" indent="-171450">
-              <a:buFontTx/>
-              <a:buChar char="-"/>
-            </a:pPr>
+              <a:t>Soviel sei gesagt…</a:t>
+            </a:r>
+          </a:p>
+          <a:p>
+            <a:endParaRPr lang="de-DE" baseline="0" dirty="0"/>
+          </a:p>
+          <a:p>
             <a:r>
               <a:rPr lang="de-DE" dirty="0"/>
-              <a:t>Anschauen</a:t>
-            </a:r>
-            <a:r>
-              <a:rPr lang="de-DE" baseline="0" dirty="0"/>
-              <a:t> der lokalen </a:t>
-            </a:r>
-            <a:r>
-              <a:rPr lang="de-DE" baseline="0" dirty="0" err="1"/>
-              <a:t>DB‘s</a:t>
-            </a:r>
-            <a:r>
-              <a:rPr lang="de-DE" baseline="0" dirty="0"/>
-              <a:t> -&gt; Git hat Repository, SVN hat Working </a:t>
-            </a:r>
-            <a:r>
-              <a:rPr lang="de-DE" baseline="0" dirty="0" err="1"/>
-              <a:t>Copy</a:t>
-            </a:r>
-            <a:endParaRPr lang="de-DE" dirty="0"/>
+              <a:t>https://www.elegosoft.com/files/Downloads/Publications/artikel_Git-vs-Subversion.pdf</a:t>
+            </a:r>
+          </a:p>
+          <a:p>
+            <a:r>
+              <a:rPr lang="de-DE" dirty="0"/>
+              <a:t>http://markgoldenstein.com/git-warum-ich-nur-noch-ungern-subversion-nutze/</a:t>
+            </a:r>
+          </a:p>
+          <a:p>
+            <a:r>
+              <a:rPr lang="de-DE" dirty="0"/>
+              <a:t>http://svnbook.red-bean.com/en/1.7/svn-book.html#svn.branchmerge.advanced.moves</a:t>
+            </a:r>
+          </a:p>
+          <a:p>
+            <a:r>
+              <a:rPr lang="de-DE"/>
+              <a:t>https://git.wiki.kernel.org/index.php/GitSvnComparison</a:t>
+            </a:r>
           </a:p>
           <a:p>
             <a:endParaRPr lang="de-DE" dirty="0"/>
@@ -5395,7 +5383,7 @@
     </p:spTree>
     <p:extLst>
       <p:ext uri="{BB962C8B-B14F-4D97-AF65-F5344CB8AC3E}">
-        <p14:creationId xmlns:p14="http://schemas.microsoft.com/office/powerpoint/2010/main" val="257792312"/>
+        <p14:creationId xmlns:p14="http://schemas.microsoft.com/office/powerpoint/2010/main" val="1197834552"/>
       </p:ext>
     </p:extLst>
   </p:cSld>
@@ -5448,6 +5436,63 @@
         <p:txBody>
           <a:bodyPr/>
           <a:lstStyle/>
+          <a:p>
+            <a:pPr marL="0" indent="0">
+              <a:buFontTx/>
+              <a:buNone/>
+            </a:pPr>
+            <a:r>
+              <a:rPr lang="de-DE" baseline="0" dirty="0"/>
+              <a:t>Der Unterschied:</a:t>
+            </a:r>
+          </a:p>
+          <a:p>
+            <a:pPr marL="171450" indent="-171450">
+              <a:buFontTx/>
+              <a:buChar char="-"/>
+            </a:pPr>
+            <a:r>
+              <a:rPr lang="de-DE" baseline="0" dirty="0"/>
+              <a:t>SVN hält nur die aktuellen Versionen der Dateien im WD vor</a:t>
+            </a:r>
+          </a:p>
+          <a:p>
+            <a:pPr marL="171450" indent="-171450">
+              <a:buFontTx/>
+              <a:buChar char="-"/>
+            </a:pPr>
+            <a:r>
+              <a:rPr lang="de-DE" baseline="0" dirty="0"/>
+              <a:t>Git hält alle Versionen lokal</a:t>
+            </a:r>
+          </a:p>
+          <a:p>
+            <a:pPr marL="171450" indent="-171450">
+              <a:buFontTx/>
+              <a:buChar char="-"/>
+            </a:pPr>
+            <a:r>
+              <a:rPr lang="de-DE" dirty="0"/>
+              <a:t>Anschauen</a:t>
+            </a:r>
+            <a:r>
+              <a:rPr lang="de-DE" baseline="0" dirty="0"/>
+              <a:t> der lokalen </a:t>
+            </a:r>
+            <a:r>
+              <a:rPr lang="de-DE" baseline="0" dirty="0" err="1"/>
+              <a:t>DB‘s</a:t>
+            </a:r>
+            <a:r>
+              <a:rPr lang="de-DE" baseline="0" dirty="0"/>
+              <a:t> -&gt; Git hat Repository, SVN hat Working </a:t>
+            </a:r>
+            <a:r>
+              <a:rPr lang="de-DE" baseline="0" dirty="0" err="1"/>
+              <a:t>Copy</a:t>
+            </a:r>
+            <a:endParaRPr lang="de-DE" dirty="0"/>
+          </a:p>
           <a:p>
             <a:endParaRPr lang="de-DE" dirty="0"/>
           </a:p>
@@ -5534,108 +5579,6 @@
           <a:bodyPr/>
           <a:lstStyle/>
           <a:p>
-            <a:pPr marL="171450" indent="-171450">
-              <a:spcBef>
-                <a:spcPts val="0"/>
-              </a:spcBef>
-              <a:spcAft>
-                <a:spcPts val="1200"/>
-              </a:spcAft>
-              <a:buFontTx/>
-              <a:buChar char="-"/>
-            </a:pPr>
-            <a:r>
-              <a:rPr lang="de-DE" b="1" baseline="0" dirty="0"/>
-              <a:t>SVN bietet bereits viele Vorteile</a:t>
-            </a:r>
-          </a:p>
-          <a:p>
-            <a:pPr marL="171450" marR="0" lvl="0" indent="-171450" algn="l" defTabSz="914400" rtl="0" eaLnBrk="0" fontAlgn="base" latinLnBrk="0" hangingPunct="0">
-              <a:lnSpc>
-                <a:spcPct val="100000"/>
-              </a:lnSpc>
-              <a:spcBef>
-                <a:spcPts val="0"/>
-              </a:spcBef>
-              <a:spcAft>
-                <a:spcPts val="1200"/>
-              </a:spcAft>
-              <a:buClrTx/>
-              <a:buSzTx/>
-              <a:buFontTx/>
-              <a:buChar char="-"/>
-              <a:tabLst/>
-              <a:defRPr/>
-            </a:pPr>
-            <a:r>
-              <a:rPr lang="de-DE" b="1" baseline="0" dirty="0"/>
-              <a:t>Für geringe Einschränkungen bietet </a:t>
-            </a:r>
-            <a:r>
-              <a:rPr lang="de-DE" b="1" baseline="0" dirty="0" err="1"/>
-              <a:t>Git</a:t>
-            </a:r>
-            <a:r>
-              <a:rPr lang="de-DE" b="1" baseline="0" dirty="0"/>
-              <a:t> mehr</a:t>
-            </a:r>
-          </a:p>
-          <a:p>
-            <a:pPr marL="171450" marR="0" lvl="0" indent="-171450" algn="l" defTabSz="914400" rtl="0" eaLnBrk="0" fontAlgn="base" latinLnBrk="0" hangingPunct="0">
-              <a:lnSpc>
-                <a:spcPct val="100000"/>
-              </a:lnSpc>
-              <a:spcBef>
-                <a:spcPts val="0"/>
-              </a:spcBef>
-              <a:spcAft>
-                <a:spcPts val="1200"/>
-              </a:spcAft>
-              <a:buClrTx/>
-              <a:buSzTx/>
-              <a:buFontTx/>
-              <a:buChar char="-"/>
-              <a:tabLst/>
-              <a:defRPr/>
-            </a:pPr>
-            <a:r>
-              <a:rPr lang="de-DE" b="1" baseline="0" dirty="0"/>
-              <a:t>SVN Repository Integration von </a:t>
-            </a:r>
-            <a:r>
-              <a:rPr lang="de-DE" b="1" baseline="0" dirty="0" err="1"/>
-              <a:t>Git</a:t>
-            </a:r>
-            <a:endParaRPr lang="de-DE" b="1" baseline="0" dirty="0"/>
-          </a:p>
-          <a:p>
-            <a:pPr marL="171450" marR="0" lvl="0" indent="-171450" algn="l" defTabSz="914400" rtl="0" eaLnBrk="0" fontAlgn="base" latinLnBrk="0" hangingPunct="0">
-              <a:lnSpc>
-                <a:spcPct val="100000"/>
-              </a:lnSpc>
-              <a:spcBef>
-                <a:spcPts val="0"/>
-              </a:spcBef>
-              <a:spcAft>
-                <a:spcPts val="1200"/>
-              </a:spcAft>
-              <a:buClrTx/>
-              <a:buSzTx/>
-              <a:buFontTx/>
-              <a:buChar char="-"/>
-              <a:tabLst/>
-              <a:defRPr/>
-            </a:pPr>
-            <a:r>
-              <a:rPr lang="de-DE" b="1" baseline="0" dirty="0"/>
-              <a:t>SVN Anwender sollten ernsthaft nachdenken</a:t>
-            </a:r>
-          </a:p>
-          <a:p>
-            <a:pPr marL="171450" indent="-171450">
-              <a:buFontTx/>
-              <a:buChar char="-"/>
-            </a:pPr>
             <a:endParaRPr lang="de-DE" dirty="0"/>
           </a:p>
         </p:txBody>
@@ -5667,7 +5610,7 @@
     </p:spTree>
     <p:extLst>
       <p:ext uri="{BB962C8B-B14F-4D97-AF65-F5344CB8AC3E}">
-        <p14:creationId xmlns:p14="http://schemas.microsoft.com/office/powerpoint/2010/main" val="2088954516"/>
+        <p14:creationId xmlns:p14="http://schemas.microsoft.com/office/powerpoint/2010/main" val="257792312"/>
       </p:ext>
     </p:extLst>
   </p:cSld>
@@ -5721,20 +5664,108 @@
           <a:bodyPr/>
           <a:lstStyle/>
           <a:p>
-            <a:r>
-              <a:rPr lang="de-DE" dirty="0"/>
-              <a:t>Die</a:t>
-            </a:r>
-            <a:r>
-              <a:rPr lang="de-DE" baseline="0" dirty="0"/>
-              <a:t> Datei wird nur einmal gespeichert.</a:t>
-            </a:r>
-          </a:p>
-          <a:p>
-            <a:r>
-              <a:rPr lang="de-DE" baseline="0" dirty="0"/>
-              <a:t>Aufbauend auf der Datei werden die Änderungen an dieser Datei als Version abgelegt.</a:t>
-            </a:r>
+            <a:pPr marL="171450" indent="-171450">
+              <a:spcBef>
+                <a:spcPts val="0"/>
+              </a:spcBef>
+              <a:spcAft>
+                <a:spcPts val="1200"/>
+              </a:spcAft>
+              <a:buFontTx/>
+              <a:buChar char="-"/>
+            </a:pPr>
+            <a:r>
+              <a:rPr lang="de-DE" b="1" baseline="0" dirty="0"/>
+              <a:t>SVN bietet bereits viele Vorteile</a:t>
+            </a:r>
+          </a:p>
+          <a:p>
+            <a:pPr marL="171450" marR="0" lvl="0" indent="-171450" algn="l" defTabSz="914400" rtl="0" eaLnBrk="0" fontAlgn="base" latinLnBrk="0" hangingPunct="0">
+              <a:lnSpc>
+                <a:spcPct val="100000"/>
+              </a:lnSpc>
+              <a:spcBef>
+                <a:spcPts val="0"/>
+              </a:spcBef>
+              <a:spcAft>
+                <a:spcPts val="1200"/>
+              </a:spcAft>
+              <a:buClrTx/>
+              <a:buSzTx/>
+              <a:buFontTx/>
+              <a:buChar char="-"/>
+              <a:tabLst/>
+              <a:defRPr/>
+            </a:pPr>
+            <a:r>
+              <a:rPr lang="de-DE" b="1" baseline="0" dirty="0"/>
+              <a:t>Für geringe Einschränkungen bietet </a:t>
+            </a:r>
+            <a:r>
+              <a:rPr lang="de-DE" b="1" baseline="0" dirty="0" err="1"/>
+              <a:t>Git</a:t>
+            </a:r>
+            <a:r>
+              <a:rPr lang="de-DE" b="1" baseline="0" dirty="0"/>
+              <a:t> mehr</a:t>
+            </a:r>
+          </a:p>
+          <a:p>
+            <a:pPr marL="171450" marR="0" lvl="0" indent="-171450" algn="l" defTabSz="914400" rtl="0" eaLnBrk="0" fontAlgn="base" latinLnBrk="0" hangingPunct="0">
+              <a:lnSpc>
+                <a:spcPct val="100000"/>
+              </a:lnSpc>
+              <a:spcBef>
+                <a:spcPts val="0"/>
+              </a:spcBef>
+              <a:spcAft>
+                <a:spcPts val="1200"/>
+              </a:spcAft>
+              <a:buClrTx/>
+              <a:buSzTx/>
+              <a:buFontTx/>
+              <a:buChar char="-"/>
+              <a:tabLst/>
+              <a:defRPr/>
+            </a:pPr>
+            <a:r>
+              <a:rPr lang="de-DE" b="1" baseline="0" dirty="0"/>
+              <a:t>SVN Repository Integration von </a:t>
+            </a:r>
+            <a:r>
+              <a:rPr lang="de-DE" b="1" baseline="0" dirty="0" err="1"/>
+              <a:t>Git</a:t>
+            </a:r>
+            <a:endParaRPr lang="de-DE" b="1" baseline="0" dirty="0"/>
+          </a:p>
+          <a:p>
+            <a:pPr marL="171450" marR="0" lvl="0" indent="-171450" algn="l" defTabSz="914400" rtl="0" eaLnBrk="0" fontAlgn="base" latinLnBrk="0" hangingPunct="0">
+              <a:lnSpc>
+                <a:spcPct val="100000"/>
+              </a:lnSpc>
+              <a:spcBef>
+                <a:spcPts val="0"/>
+              </a:spcBef>
+              <a:spcAft>
+                <a:spcPts val="1200"/>
+              </a:spcAft>
+              <a:buClrTx/>
+              <a:buSzTx/>
+              <a:buFontTx/>
+              <a:buChar char="-"/>
+              <a:tabLst/>
+              <a:defRPr/>
+            </a:pPr>
+            <a:r>
+              <a:rPr lang="de-DE" b="1" baseline="0" dirty="0"/>
+              <a:t>SVN Anwender sollten ernsthaft nachdenken</a:t>
+            </a:r>
+          </a:p>
+          <a:p>
+            <a:pPr marL="171450" indent="-171450">
+              <a:buFontTx/>
+              <a:buChar char="-"/>
+            </a:pPr>
             <a:endParaRPr lang="de-DE" dirty="0"/>
           </a:p>
         </p:txBody>
@@ -5757,7 +5788,7 @@
             <a:fld id="{269F4C00-FE88-4296-AE19-2C7D870243C7}" type="slidenum">
               <a:rPr lang="de-DE" smtClean="0"/>
               <a:pPr/>
-              <a:t>40</a:t>
+              <a:t>38</a:t>
             </a:fld>
             <a:endParaRPr lang="de-DE" dirty="0"/>
           </a:p>
@@ -5766,7 +5797,7 @@
     </p:spTree>
     <p:extLst>
       <p:ext uri="{BB962C8B-B14F-4D97-AF65-F5344CB8AC3E}">
-        <p14:creationId xmlns:p14="http://schemas.microsoft.com/office/powerpoint/2010/main" val="564577279"/>
+        <p14:creationId xmlns:p14="http://schemas.microsoft.com/office/powerpoint/2010/main" val="2088954516"/>
       </p:ext>
     </p:extLst>
   </p:cSld>
@@ -5821,28 +5852,18 @@
           <a:lstStyle/>
           <a:p>
             <a:r>
-              <a:rPr lang="de-DE" sz="1200" b="0" i="0" u="none" strike="noStrike" kern="1200" baseline="0" dirty="0">
-                <a:solidFill>
-                  <a:schemeClr val="tx1"/>
-                </a:solidFill>
-                <a:latin typeface="Times" pitchFamily="18" charset="0"/>
-                <a:ea typeface="+mn-ea"/>
-                <a:cs typeface="+mn-cs"/>
-              </a:rPr>
-              <a:t>Version ist ein Snapshot des aktuellen Zustands sämtlicher Dateien </a:t>
-            </a:r>
-          </a:p>
-          <a:p>
-            <a:r>
-              <a:rPr lang="de-DE" sz="1200" b="0" i="0" u="none" strike="noStrike" kern="1200" baseline="0" dirty="0">
-                <a:solidFill>
-                  <a:schemeClr val="tx1"/>
-                </a:solidFill>
-                <a:latin typeface="Times" pitchFamily="18" charset="0"/>
-                <a:ea typeface="+mn-ea"/>
-                <a:cs typeface="+mn-cs"/>
-              </a:rPr>
-              <a:t>unveränderte Dateien nur Verknüpfung zu der vorherigen Version</a:t>
+              <a:rPr lang="de-DE" dirty="0"/>
+              <a:t>Die</a:t>
+            </a:r>
+            <a:r>
+              <a:rPr lang="de-DE" baseline="0" dirty="0"/>
+              <a:t> Datei wird nur einmal gespeichert.</a:t>
+            </a:r>
+          </a:p>
+          <a:p>
+            <a:r>
+              <a:rPr lang="de-DE" baseline="0" dirty="0"/>
+              <a:t>Aufbauend auf der Datei werden die Änderungen an dieser Datei als Version abgelegt.</a:t>
             </a:r>
             <a:endParaRPr lang="de-DE" dirty="0"/>
           </a:p>
@@ -5866,7 +5887,7 @@
             <a:fld id="{269F4C00-FE88-4296-AE19-2C7D870243C7}" type="slidenum">
               <a:rPr lang="de-DE" smtClean="0"/>
               <a:pPr/>
-              <a:t>41</a:t>
+              <a:t>42</a:t>
             </a:fld>
             <a:endParaRPr lang="de-DE" dirty="0"/>
           </a:p>
@@ -5875,7 +5896,7 @@
     </p:spTree>
     <p:extLst>
       <p:ext uri="{BB962C8B-B14F-4D97-AF65-F5344CB8AC3E}">
-        <p14:creationId xmlns:p14="http://schemas.microsoft.com/office/powerpoint/2010/main" val="3698202152"/>
+        <p14:creationId xmlns:p14="http://schemas.microsoft.com/office/powerpoint/2010/main" val="564577279"/>
       </p:ext>
     </p:extLst>
   </p:cSld>
@@ -6174,6 +6195,115 @@
     <p:extLst>
       <p:ext uri="{BB962C8B-B14F-4D97-AF65-F5344CB8AC3E}">
         <p14:creationId xmlns:p14="http://schemas.microsoft.com/office/powerpoint/2010/main" val="2340969881"/>
+      </p:ext>
+    </p:extLst>
+  </p:cSld>
+  <p:clrMapOvr>
+    <a:masterClrMapping/>
+  </p:clrMapOvr>
+</p:notes>
+</file>
+
+<file path=ppt/notesSlides/notesSlide40.xml><?xml version="1.0" encoding="utf-8"?>
+<p:notes xmlns:a="http://schemas.openxmlformats.org/drawingml/2006/main" xmlns:r="http://schemas.openxmlformats.org/officeDocument/2006/relationships" xmlns:p="http://schemas.openxmlformats.org/presentationml/2006/main">
+  <p:cSld>
+    <p:spTree>
+      <p:nvGrpSpPr>
+        <p:cNvPr id="1" name=""/>
+        <p:cNvGrpSpPr/>
+        <p:nvPr/>
+      </p:nvGrpSpPr>
+      <p:grpSpPr>
+        <a:xfrm>
+          <a:off x="0" y="0"/>
+          <a:ext cx="0" cy="0"/>
+          <a:chOff x="0" y="0"/>
+          <a:chExt cx="0" cy="0"/>
+        </a:xfrm>
+      </p:grpSpPr>
+      <p:sp>
+        <p:nvSpPr>
+          <p:cNvPr id="2" name="Folienbildplatzhalter 1"/>
+          <p:cNvSpPr>
+            <a:spLocks noGrp="1" noRot="1" noChangeAspect="1"/>
+          </p:cNvSpPr>
+          <p:nvPr>
+            <p:ph type="sldImg"/>
+          </p:nvPr>
+        </p:nvSpPr>
+        <p:spPr/>
+      </p:sp>
+      <p:sp>
+        <p:nvSpPr>
+          <p:cNvPr id="3" name="Notizenplatzhalter 2"/>
+          <p:cNvSpPr>
+            <a:spLocks noGrp="1"/>
+          </p:cNvSpPr>
+          <p:nvPr>
+            <p:ph type="body" idx="1"/>
+          </p:nvPr>
+        </p:nvSpPr>
+        <p:spPr/>
+        <p:txBody>
+          <a:bodyPr/>
+          <a:lstStyle/>
+          <a:p>
+            <a:r>
+              <a:rPr lang="de-DE" sz="1200" b="0" i="0" u="none" strike="noStrike" kern="1200" baseline="0" dirty="0">
+                <a:solidFill>
+                  <a:schemeClr val="tx1"/>
+                </a:solidFill>
+                <a:latin typeface="Times" pitchFamily="18" charset="0"/>
+                <a:ea typeface="+mn-ea"/>
+                <a:cs typeface="+mn-cs"/>
+              </a:rPr>
+              <a:t>Version ist ein Snapshot des aktuellen Zustands sämtlicher Dateien </a:t>
+            </a:r>
+          </a:p>
+          <a:p>
+            <a:r>
+              <a:rPr lang="de-DE" sz="1200" b="0" i="0" u="none" strike="noStrike" kern="1200" baseline="0" dirty="0">
+                <a:solidFill>
+                  <a:schemeClr val="tx1"/>
+                </a:solidFill>
+                <a:latin typeface="Times" pitchFamily="18" charset="0"/>
+                <a:ea typeface="+mn-ea"/>
+                <a:cs typeface="+mn-cs"/>
+              </a:rPr>
+              <a:t>unveränderte Dateien nur Verknüpfung zu der vorherigen Version</a:t>
+            </a:r>
+            <a:endParaRPr lang="de-DE" dirty="0"/>
+          </a:p>
+        </p:txBody>
+      </p:sp>
+      <p:sp>
+        <p:nvSpPr>
+          <p:cNvPr id="4" name="Foliennummernplatzhalter 3"/>
+          <p:cNvSpPr>
+            <a:spLocks noGrp="1"/>
+          </p:cNvSpPr>
+          <p:nvPr>
+            <p:ph type="sldNum" sz="quarter" idx="10"/>
+          </p:nvPr>
+        </p:nvSpPr>
+        <p:spPr/>
+        <p:txBody>
+          <a:bodyPr/>
+          <a:lstStyle/>
+          <a:p>
+            <a:fld id="{269F4C00-FE88-4296-AE19-2C7D870243C7}" type="slidenum">
+              <a:rPr lang="de-DE" smtClean="0"/>
+              <a:pPr/>
+              <a:t>43</a:t>
+            </a:fld>
+            <a:endParaRPr lang="de-DE" dirty="0"/>
+          </a:p>
+        </p:txBody>
+      </p:sp>
+    </p:spTree>
+    <p:extLst>
+      <p:ext uri="{BB962C8B-B14F-4D97-AF65-F5344CB8AC3E}">
+        <p14:creationId xmlns:p14="http://schemas.microsoft.com/office/powerpoint/2010/main" val="3698202152"/>
       </p:ext>
     </p:extLst>
   </p:cSld>
@@ -41688,6 +41818,225 @@
       </p:sp>
       <p:sp>
         <p:nvSpPr>
+          <p:cNvPr id="5" name="Textplatzhalter 4"/>
+          <p:cNvSpPr>
+            <a:spLocks noGrp="1"/>
+          </p:cNvSpPr>
+          <p:nvPr>
+            <p:ph type="body" sz="quarter" idx="17"/>
+          </p:nvPr>
+        </p:nvSpPr>
+        <p:spPr>
+          <a:xfrm>
+            <a:off x="2505076" y="1556830"/>
+            <a:ext cx="6816725" cy="1609452"/>
+          </a:xfrm>
+        </p:spPr>
+        <p:txBody>
+          <a:bodyPr/>
+          <a:lstStyle/>
+          <a:p>
+            <a:pPr marL="285750" indent="-285750">
+              <a:buFontTx/>
+              <a:buChar char="-"/>
+            </a:pPr>
+            <a:r>
+              <a:rPr lang="de-DE" dirty="0" err="1"/>
+              <a:t>Merge</a:t>
+            </a:r>
+            <a:r>
+              <a:rPr lang="de-DE" dirty="0"/>
+              <a:t> von </a:t>
+            </a:r>
+            <a:r>
+              <a:rPr lang="de-DE" dirty="0" err="1"/>
+              <a:t>Git</a:t>
+            </a:r>
+            <a:r>
+              <a:rPr lang="de-DE" dirty="0"/>
+              <a:t> ist schneller und fehlerfreier</a:t>
+            </a:r>
+          </a:p>
+          <a:p>
+            <a:pPr marL="285750" indent="-285750">
+              <a:buFontTx/>
+              <a:buChar char="-"/>
+            </a:pPr>
+            <a:r>
+              <a:rPr lang="de-DE" dirty="0"/>
+              <a:t>SVN hat beim </a:t>
+            </a:r>
+            <a:r>
+              <a:rPr lang="de-DE" dirty="0" err="1"/>
+              <a:t>Merge</a:t>
+            </a:r>
+            <a:r>
+              <a:rPr lang="de-DE" dirty="0"/>
+              <a:t> mehr Probleme</a:t>
+            </a:r>
+          </a:p>
+          <a:p>
+            <a:pPr marL="285750" indent="-285750">
+              <a:buFontTx/>
+              <a:buChar char="-"/>
+            </a:pPr>
+            <a:r>
+              <a:rPr lang="de-DE" dirty="0"/>
+              <a:t>Z.B. „</a:t>
+            </a:r>
+            <a:r>
+              <a:rPr lang="de-DE" dirty="0" err="1"/>
+              <a:t>Evil</a:t>
+            </a:r>
+            <a:r>
+              <a:rPr lang="de-DE" dirty="0"/>
+              <a:t> </a:t>
+            </a:r>
+            <a:r>
+              <a:rPr lang="de-DE" dirty="0" err="1"/>
+              <a:t>Twin</a:t>
+            </a:r>
+            <a:r>
+              <a:rPr lang="de-DE" dirty="0"/>
+              <a:t>“ Problem</a:t>
+            </a:r>
+          </a:p>
+          <a:p>
+            <a:pPr marL="285750" indent="-285750">
+              <a:buFontTx/>
+              <a:buChar char="-"/>
+            </a:pPr>
+            <a:r>
+              <a:rPr lang="de-DE" dirty="0"/>
+              <a:t>SVN hat kein internes Konzept für einen </a:t>
+            </a:r>
+            <a:r>
+              <a:rPr lang="de-DE" dirty="0" err="1"/>
+              <a:t>Branch</a:t>
+            </a:r>
+            <a:endParaRPr lang="de-DE" dirty="0"/>
+          </a:p>
+          <a:p>
+            <a:pPr marL="285750" indent="-285750">
+              <a:buFontTx/>
+              <a:buChar char="-"/>
+            </a:pPr>
+            <a:r>
+              <a:rPr lang="de-DE" dirty="0" err="1"/>
+              <a:t>Branch</a:t>
+            </a:r>
+            <a:r>
+              <a:rPr lang="de-DE" dirty="0"/>
+              <a:t> ist nur ein Verzeichnis im Dateisystem des Repository</a:t>
+            </a:r>
+          </a:p>
+        </p:txBody>
+      </p:sp>
+      <p:sp>
+        <p:nvSpPr>
+          <p:cNvPr id="3" name="Textplatzhalter 2"/>
+          <p:cNvSpPr>
+            <a:spLocks noGrp="1"/>
+          </p:cNvSpPr>
+          <p:nvPr>
+            <p:ph type="body" sz="quarter" idx="11"/>
+          </p:nvPr>
+        </p:nvSpPr>
+        <p:spPr/>
+        <p:txBody>
+          <a:bodyPr/>
+          <a:lstStyle/>
+          <a:p>
+            <a:r>
+              <a:rPr lang="de-DE" dirty="0"/>
+              <a:t>Vor und Nachteile</a:t>
+            </a:r>
+          </a:p>
+        </p:txBody>
+      </p:sp>
+      <p:sp>
+        <p:nvSpPr>
+          <p:cNvPr id="4" name="Titel 3"/>
+          <p:cNvSpPr>
+            <a:spLocks noGrp="1"/>
+          </p:cNvSpPr>
+          <p:nvPr>
+            <p:ph type="title"/>
+          </p:nvPr>
+        </p:nvSpPr>
+        <p:spPr/>
+        <p:txBody>
+          <a:bodyPr/>
+          <a:lstStyle/>
+          <a:p>
+            <a:r>
+              <a:rPr lang="de-DE" dirty="0" err="1"/>
+              <a:t>Git</a:t>
+            </a:r>
+            <a:r>
+              <a:rPr lang="de-DE" dirty="0"/>
+              <a:t> versus SVN</a:t>
+            </a:r>
+          </a:p>
+        </p:txBody>
+      </p:sp>
+    </p:spTree>
+    <p:extLst>
+      <p:ext uri="{BB962C8B-B14F-4D97-AF65-F5344CB8AC3E}">
+        <p14:creationId xmlns:p14="http://schemas.microsoft.com/office/powerpoint/2010/main" val="441673036"/>
+      </p:ext>
+    </p:extLst>
+  </p:cSld>
+  <p:clrMapOvr>
+    <a:masterClrMapping/>
+  </p:clrMapOvr>
+  <p:transition/>
+</p:sld>
+</file>
+
+<file path=ppt/slides/slide36.xml><?xml version="1.0" encoding="utf-8"?>
+<p:sld xmlns:a="http://schemas.openxmlformats.org/drawingml/2006/main" xmlns:r="http://schemas.openxmlformats.org/officeDocument/2006/relationships" xmlns:p="http://schemas.openxmlformats.org/presentationml/2006/main">
+  <p:cSld>
+    <p:spTree>
+      <p:nvGrpSpPr>
+        <p:cNvPr id="1" name=""/>
+        <p:cNvGrpSpPr/>
+        <p:nvPr/>
+      </p:nvGrpSpPr>
+      <p:grpSpPr>
+        <a:xfrm>
+          <a:off x="0" y="0"/>
+          <a:ext cx="0" cy="0"/>
+          <a:chOff x="0" y="0"/>
+          <a:chExt cx="0" cy="0"/>
+        </a:xfrm>
+      </p:grpSpPr>
+      <p:sp>
+        <p:nvSpPr>
+          <p:cNvPr id="2" name="Foliennummernplatzhalter 1"/>
+          <p:cNvSpPr>
+            <a:spLocks noGrp="1"/>
+          </p:cNvSpPr>
+          <p:nvPr>
+            <p:ph type="sldNum" sz="quarter" idx="13"/>
+          </p:nvPr>
+        </p:nvSpPr>
+        <p:spPr/>
+        <p:txBody>
+          <a:bodyPr/>
+          <a:lstStyle/>
+          <a:p>
+            <a:fld id="{2E430B67-9B8D-45F2-8BD0-7EEC5CABEC81}" type="slidenum">
+              <a:rPr lang="de-DE" smtClean="0"/>
+              <a:pPr/>
+              <a:t>36</a:t>
+            </a:fld>
+            <a:endParaRPr lang="de-DE"/>
+          </a:p>
+        </p:txBody>
+      </p:sp>
+      <p:sp>
+        <p:nvSpPr>
           <p:cNvPr id="4" name="Textplatzhalter 3"/>
           <p:cNvSpPr>
             <a:spLocks noGrp="1"/>
@@ -41739,7 +42088,7 @@
           <p:nvPr>
             <p:extLst>
               <p:ext uri="{D42A27DB-BD31-4B8C-83A1-F6EECF244321}">
-                <p14:modId xmlns:p14="http://schemas.microsoft.com/office/powerpoint/2010/main" val="2215127685"/>
+                <p14:modId xmlns:p14="http://schemas.microsoft.com/office/powerpoint/2010/main" val="3814338920"/>
               </p:ext>
             </p:extLst>
           </p:nvPr>
@@ -42290,7 +42639,7 @@
                         <a:rPr lang="de-DE" dirty="0">
                           <a:latin typeface="Calibri" panose="020F0502020204030204" pitchFamily="34" charset="0"/>
                         </a:rPr>
-                        <a:t>Weniger Speicherbedarf</a:t>
+                        <a:t>Weniger Speicherbedarf auf Client</a:t>
                       </a:r>
                     </a:p>
                   </a:txBody>
@@ -42328,7 +42677,7 @@
                         <a:rPr lang="de-DE" dirty="0">
                           <a:latin typeface="Calibri" panose="020F0502020204030204" pitchFamily="34" charset="0"/>
                         </a:rPr>
-                        <a:t>Höherer Speicherbedarf</a:t>
+                        <a:t>Höherer Speicherbedarf auf Client</a:t>
                       </a:r>
                     </a:p>
                   </a:txBody>
@@ -42364,7 +42713,7 @@
 </p:sld>
 </file>
 
-<file path=ppt/slides/slide36.xml><?xml version="1.0" encoding="utf-8"?>
+<file path=ppt/slides/slide37.xml><?xml version="1.0" encoding="utf-8"?>
 <p:sld xmlns:a="http://schemas.openxmlformats.org/drawingml/2006/main" xmlns:r="http://schemas.openxmlformats.org/officeDocument/2006/relationships" xmlns:p="http://schemas.openxmlformats.org/presentationml/2006/main">
   <p:cSld>
     <p:spTree>
@@ -42399,7 +42748,7 @@
             <a:fld id="{2E430B67-9B8D-45F2-8BD0-7EEC5CABEC81}" type="slidenum">
               <a:rPr lang="de-DE" smtClean="0"/>
               <a:pPr/>
-              <a:t>36</a:t>
+              <a:t>37</a:t>
             </a:fld>
             <a:endParaRPr lang="de-DE"/>
           </a:p>
@@ -42458,7 +42807,7 @@
           <p:nvPr>
             <p:extLst>
               <p:ext uri="{D42A27DB-BD31-4B8C-83A1-F6EECF244321}">
-                <p14:modId xmlns:p14="http://schemas.microsoft.com/office/powerpoint/2010/main" val="3282297596"/>
+                <p14:modId xmlns:p14="http://schemas.microsoft.com/office/powerpoint/2010/main" val="3222776164"/>
               </p:ext>
             </p:extLst>
           </p:nvPr>
@@ -43009,7 +43358,7 @@
                         <a:rPr lang="de-DE" dirty="0">
                           <a:latin typeface="Calibri" panose="020F0502020204030204" pitchFamily="34" charset="0"/>
                         </a:rPr>
-                        <a:t>Weniger Speicherbedarf</a:t>
+                        <a:t>Weniger Speicherbedarf auf Client</a:t>
                       </a:r>
                     </a:p>
                   </a:txBody>
@@ -43045,7 +43394,7 @@
                         <a:rPr lang="de-DE" dirty="0">
                           <a:latin typeface="Calibri" panose="020F0502020204030204" pitchFamily="34" charset="0"/>
                         </a:rPr>
-                        <a:t>Höherer Speicherbedarf</a:t>
+                        <a:t>Höherer Speicherbedarf auf Client</a:t>
                       </a:r>
                     </a:p>
                   </a:txBody>
@@ -43124,148 +43473,6 @@
 </p:sld>
 </file>
 
-<file path=ppt/slides/slide37.xml><?xml version="1.0" encoding="utf-8"?>
-<p:sld xmlns:a="http://schemas.openxmlformats.org/drawingml/2006/main" xmlns:r="http://schemas.openxmlformats.org/officeDocument/2006/relationships" xmlns:p="http://schemas.openxmlformats.org/presentationml/2006/main">
-  <p:cSld>
-    <p:spTree>
-      <p:nvGrpSpPr>
-        <p:cNvPr id="1" name=""/>
-        <p:cNvGrpSpPr/>
-        <p:nvPr/>
-      </p:nvGrpSpPr>
-      <p:grpSpPr>
-        <a:xfrm>
-          <a:off x="0" y="0"/>
-          <a:ext cx="0" cy="0"/>
-          <a:chOff x="0" y="0"/>
-          <a:chExt cx="0" cy="0"/>
-        </a:xfrm>
-      </p:grpSpPr>
-      <p:sp>
-        <p:nvSpPr>
-          <p:cNvPr id="2" name="Foliennummernplatzhalter 1"/>
-          <p:cNvSpPr>
-            <a:spLocks noGrp="1"/>
-          </p:cNvSpPr>
-          <p:nvPr>
-            <p:ph type="sldNum" sz="quarter" idx="13"/>
-          </p:nvPr>
-        </p:nvSpPr>
-        <p:spPr/>
-        <p:txBody>
-          <a:bodyPr/>
-          <a:lstStyle/>
-          <a:p>
-            <a:fld id="{2E430B67-9B8D-45F2-8BD0-7EEC5CABEC81}" type="slidenum">
-              <a:rPr lang="de-DE" smtClean="0"/>
-              <a:pPr/>
-              <a:t>37</a:t>
-            </a:fld>
-            <a:endParaRPr lang="de-DE"/>
-          </a:p>
-        </p:txBody>
-      </p:sp>
-      <p:sp>
-        <p:nvSpPr>
-          <p:cNvPr id="3" name="Textplatzhalter 2"/>
-          <p:cNvSpPr>
-            <a:spLocks noGrp="1"/>
-          </p:cNvSpPr>
-          <p:nvPr>
-            <p:ph type="body" sz="quarter" idx="17"/>
-          </p:nvPr>
-        </p:nvSpPr>
-        <p:spPr>
-          <a:xfrm>
-            <a:off x="191070" y="3029803"/>
-            <a:ext cx="9130732" cy="3166569"/>
-          </a:xfrm>
-        </p:spPr>
-        <p:txBody>
-          <a:bodyPr/>
-          <a:lstStyle/>
-          <a:p>
-            <a:pPr marL="0" indent="0" algn="ctr"/>
-            <a:r>
-              <a:rPr lang="de-DE" sz="2000" b="1" dirty="0"/>
-              <a:t>Wenn der Wind des Wandels weht, bauen die Einen Schutzmauern, die Anderen bauen Windmühlen.</a:t>
-            </a:r>
-          </a:p>
-          <a:p>
-            <a:pPr marL="0" indent="0" algn="ctr"/>
-            <a:r>
-              <a:rPr lang="de-DE" dirty="0"/>
-              <a:t>(Chinesische Weisheit)</a:t>
-            </a:r>
-          </a:p>
-          <a:p>
-            <a:pPr marL="0" indent="0" algn="ctr"/>
-            <a:endParaRPr lang="de-DE" sz="2000" b="1" dirty="0"/>
-          </a:p>
-          <a:p>
-            <a:pPr marL="0" indent="0" algn="ctr"/>
-            <a:endParaRPr lang="de-DE" sz="2000" b="1" dirty="0"/>
-          </a:p>
-        </p:txBody>
-      </p:sp>
-      <p:sp>
-        <p:nvSpPr>
-          <p:cNvPr id="4" name="Textplatzhalter 3"/>
-          <p:cNvSpPr>
-            <a:spLocks noGrp="1"/>
-          </p:cNvSpPr>
-          <p:nvPr>
-            <p:ph type="body" sz="quarter" idx="11"/>
-          </p:nvPr>
-        </p:nvSpPr>
-        <p:spPr/>
-        <p:txBody>
-          <a:bodyPr/>
-          <a:lstStyle/>
-          <a:p>
-            <a:r>
-              <a:rPr lang="de-DE" dirty="0"/>
-              <a:t>Fazit</a:t>
-            </a:r>
-          </a:p>
-        </p:txBody>
-      </p:sp>
-      <p:sp>
-        <p:nvSpPr>
-          <p:cNvPr id="5" name="Titel 4"/>
-          <p:cNvSpPr>
-            <a:spLocks noGrp="1"/>
-          </p:cNvSpPr>
-          <p:nvPr>
-            <p:ph type="title"/>
-          </p:nvPr>
-        </p:nvSpPr>
-        <p:spPr/>
-        <p:txBody>
-          <a:bodyPr/>
-          <a:lstStyle/>
-          <a:p>
-            <a:r>
-              <a:rPr lang="de-DE" dirty="0"/>
-              <a:t>Git versus SVN</a:t>
-            </a:r>
-          </a:p>
-        </p:txBody>
-      </p:sp>
-    </p:spTree>
-    <p:extLst>
-      <p:ext uri="{BB962C8B-B14F-4D97-AF65-F5344CB8AC3E}">
-        <p14:creationId xmlns:p14="http://schemas.microsoft.com/office/powerpoint/2010/main" val="53364534"/>
-      </p:ext>
-    </p:extLst>
-  </p:cSld>
-  <p:clrMapOvr>
-    <a:masterClrMapping/>
-  </p:clrMapOvr>
-  <p:transition/>
-</p:sld>
-</file>
-
 <file path=ppt/slides/slide38.xml><?xml version="1.0" encoding="utf-8"?>
 <p:sld xmlns:a="http://schemas.openxmlformats.org/drawingml/2006/main" xmlns:r="http://schemas.openxmlformats.org/officeDocument/2006/relationships" xmlns:p="http://schemas.openxmlformats.org/presentationml/2006/main">
   <p:cSld>
@@ -43302,6 +43509,230 @@
               <a:rPr lang="de-DE" smtClean="0"/>
               <a:pPr/>
               <a:t>38</a:t>
+            </a:fld>
+            <a:endParaRPr lang="de-DE"/>
+          </a:p>
+        </p:txBody>
+      </p:sp>
+      <p:sp>
+        <p:nvSpPr>
+          <p:cNvPr id="3" name="Textplatzhalter 2"/>
+          <p:cNvSpPr>
+            <a:spLocks noGrp="1"/>
+          </p:cNvSpPr>
+          <p:nvPr>
+            <p:ph type="body" sz="quarter" idx="17"/>
+          </p:nvPr>
+        </p:nvSpPr>
+        <p:spPr>
+          <a:xfrm>
+            <a:off x="191070" y="3029803"/>
+            <a:ext cx="9130732" cy="3166569"/>
+          </a:xfrm>
+        </p:spPr>
+        <p:txBody>
+          <a:bodyPr/>
+          <a:lstStyle/>
+          <a:p>
+            <a:pPr marL="0" indent="0" algn="ctr"/>
+            <a:r>
+              <a:rPr lang="de-DE" sz="2000" b="1" dirty="0"/>
+              <a:t>Wenn der Wind des Wandels weht, bauen die Einen Schutzmauern, die Anderen bauen Windmühlen.</a:t>
+            </a:r>
+          </a:p>
+          <a:p>
+            <a:pPr marL="0" indent="0" algn="ctr"/>
+            <a:r>
+              <a:rPr lang="de-DE" dirty="0"/>
+              <a:t>(Chinesische Weisheit)</a:t>
+            </a:r>
+          </a:p>
+          <a:p>
+            <a:pPr marL="0" indent="0" algn="ctr"/>
+            <a:endParaRPr lang="de-DE" sz="2000" b="1" dirty="0"/>
+          </a:p>
+          <a:p>
+            <a:pPr marL="0" indent="0" algn="ctr"/>
+            <a:endParaRPr lang="de-DE" sz="2000" b="1" dirty="0"/>
+          </a:p>
+        </p:txBody>
+      </p:sp>
+      <p:sp>
+        <p:nvSpPr>
+          <p:cNvPr id="4" name="Textplatzhalter 3"/>
+          <p:cNvSpPr>
+            <a:spLocks noGrp="1"/>
+          </p:cNvSpPr>
+          <p:nvPr>
+            <p:ph type="body" sz="quarter" idx="11"/>
+          </p:nvPr>
+        </p:nvSpPr>
+        <p:spPr/>
+        <p:txBody>
+          <a:bodyPr/>
+          <a:lstStyle/>
+          <a:p>
+            <a:r>
+              <a:rPr lang="de-DE" dirty="0"/>
+              <a:t>Fazit</a:t>
+            </a:r>
+          </a:p>
+        </p:txBody>
+      </p:sp>
+      <p:sp>
+        <p:nvSpPr>
+          <p:cNvPr id="5" name="Titel 4"/>
+          <p:cNvSpPr>
+            <a:spLocks noGrp="1"/>
+          </p:cNvSpPr>
+          <p:nvPr>
+            <p:ph type="title"/>
+          </p:nvPr>
+        </p:nvSpPr>
+        <p:spPr/>
+        <p:txBody>
+          <a:bodyPr/>
+          <a:lstStyle/>
+          <a:p>
+            <a:r>
+              <a:rPr lang="de-DE" dirty="0"/>
+              <a:t>Git versus SVN</a:t>
+            </a:r>
+          </a:p>
+        </p:txBody>
+      </p:sp>
+      <p:pic>
+        <p:nvPicPr>
+          <p:cNvPr id="1025" name="Picture 1" descr="Henry Ford"/>
+          <p:cNvPicPr>
+            <a:picLocks noChangeAspect="1" noChangeArrowheads="1"/>
+          </p:cNvPicPr>
+          <p:nvPr/>
+        </p:nvPicPr>
+        <p:blipFill>
+          <a:blip r:embed="rId3" cstate="print">
+            <a:extLst>
+              <a:ext uri="{28A0092B-C50C-407E-A947-70E740481C1C}">
+                <a14:useLocalDpi xmlns:a14="http://schemas.microsoft.com/office/drawing/2010/main" val="0"/>
+              </a:ext>
+            </a:extLst>
+          </a:blip>
+          <a:srcRect/>
+          <a:stretch>
+            <a:fillRect/>
+          </a:stretch>
+        </p:blipFill>
+        <p:spPr bwMode="auto">
+          <a:xfrm>
+            <a:off x="0" y="0"/>
+            <a:ext cx="485775" cy="647700"/>
+          </a:xfrm>
+          <a:prstGeom prst="rect">
+            <a:avLst/>
+          </a:prstGeom>
+          <a:noFill/>
+          <a:extLst>
+            <a:ext uri="{909E8E84-426E-40DD-AFC4-6F175D3DCCD1}">
+              <a14:hiddenFill xmlns:a14="http://schemas.microsoft.com/office/drawing/2010/main">
+                <a:solidFill>
+                  <a:srgbClr val="FFFFFF"/>
+                </a:solidFill>
+              </a14:hiddenFill>
+            </a:ext>
+          </a:extLst>
+        </p:spPr>
+      </p:pic>
+      <p:pic>
+        <p:nvPicPr>
+          <p:cNvPr id="1026" name="Picture 2" descr="Henry Ford"/>
+          <p:cNvPicPr>
+            <a:picLocks noChangeAspect="1" noChangeArrowheads="1"/>
+          </p:cNvPicPr>
+          <p:nvPr/>
+        </p:nvPicPr>
+        <p:blipFill>
+          <a:blip r:embed="rId3" cstate="print">
+            <a:extLst>
+              <a:ext uri="{28A0092B-C50C-407E-A947-70E740481C1C}">
+                <a14:useLocalDpi xmlns:a14="http://schemas.microsoft.com/office/drawing/2010/main" val="0"/>
+              </a:ext>
+            </a:extLst>
+          </a:blip>
+          <a:srcRect/>
+          <a:stretch>
+            <a:fillRect/>
+          </a:stretch>
+        </p:blipFill>
+        <p:spPr bwMode="auto">
+          <a:xfrm>
+            <a:off x="0" y="0"/>
+            <a:ext cx="485775" cy="647700"/>
+          </a:xfrm>
+          <a:prstGeom prst="rect">
+            <a:avLst/>
+          </a:prstGeom>
+          <a:noFill/>
+          <a:extLst>
+            <a:ext uri="{909E8E84-426E-40DD-AFC4-6F175D3DCCD1}">
+              <a14:hiddenFill xmlns:a14="http://schemas.microsoft.com/office/drawing/2010/main">
+                <a:solidFill>
+                  <a:srgbClr val="FFFFFF"/>
+                </a:solidFill>
+              </a14:hiddenFill>
+            </a:ext>
+          </a:extLst>
+        </p:spPr>
+      </p:pic>
+    </p:spTree>
+    <p:extLst>
+      <p:ext uri="{BB962C8B-B14F-4D97-AF65-F5344CB8AC3E}">
+        <p14:creationId xmlns:p14="http://schemas.microsoft.com/office/powerpoint/2010/main" val="53364534"/>
+      </p:ext>
+    </p:extLst>
+  </p:cSld>
+  <p:clrMapOvr>
+    <a:masterClrMapping/>
+  </p:clrMapOvr>
+  <p:transition/>
+</p:sld>
+</file>
+
+<file path=ppt/slides/slide39.xml><?xml version="1.0" encoding="utf-8"?>
+<p:sld xmlns:a="http://schemas.openxmlformats.org/drawingml/2006/main" xmlns:r="http://schemas.openxmlformats.org/officeDocument/2006/relationships" xmlns:p="http://schemas.openxmlformats.org/presentationml/2006/main">
+  <p:cSld>
+    <p:spTree>
+      <p:nvGrpSpPr>
+        <p:cNvPr id="1" name=""/>
+        <p:cNvGrpSpPr/>
+        <p:nvPr/>
+      </p:nvGrpSpPr>
+      <p:grpSpPr>
+        <a:xfrm>
+          <a:off x="0" y="0"/>
+          <a:ext cx="0" cy="0"/>
+          <a:chOff x="0" y="0"/>
+          <a:chExt cx="0" cy="0"/>
+        </a:xfrm>
+      </p:grpSpPr>
+      <p:sp>
+        <p:nvSpPr>
+          <p:cNvPr id="2" name="Foliennummernplatzhalter 1"/>
+          <p:cNvSpPr>
+            <a:spLocks noGrp="1"/>
+          </p:cNvSpPr>
+          <p:nvPr>
+            <p:ph type="sldNum" sz="quarter" idx="13"/>
+          </p:nvPr>
+        </p:nvSpPr>
+        <p:spPr/>
+        <p:txBody>
+          <a:bodyPr/>
+          <a:lstStyle/>
+          <a:p>
+            <a:fld id="{2E430B67-9B8D-45F2-8BD0-7EEC5CABEC81}" type="slidenum">
+              <a:rPr lang="de-DE" smtClean="0"/>
+              <a:pPr/>
+              <a:t>39</a:t>
             </a:fld>
             <a:endParaRPr lang="de-DE"/>
           </a:p>
@@ -43497,121 +43928,6 @@
     <p:extLst>
       <p:ext uri="{BB962C8B-B14F-4D97-AF65-F5344CB8AC3E}">
         <p14:creationId xmlns:p14="http://schemas.microsoft.com/office/powerpoint/2010/main" val="1853585112"/>
-      </p:ext>
-    </p:extLst>
-  </p:cSld>
-  <p:clrMapOvr>
-    <a:masterClrMapping/>
-  </p:clrMapOvr>
-  <p:transition/>
-</p:sld>
-</file>
-
-<file path=ppt/slides/slide39.xml><?xml version="1.0" encoding="utf-8"?>
-<p:sld xmlns:a="http://schemas.openxmlformats.org/drawingml/2006/main" xmlns:r="http://schemas.openxmlformats.org/officeDocument/2006/relationships" xmlns:p="http://schemas.openxmlformats.org/presentationml/2006/main">
-  <p:cSld>
-    <p:spTree>
-      <p:nvGrpSpPr>
-        <p:cNvPr id="1" name=""/>
-        <p:cNvGrpSpPr/>
-        <p:nvPr/>
-      </p:nvGrpSpPr>
-      <p:grpSpPr>
-        <a:xfrm>
-          <a:off x="0" y="0"/>
-          <a:ext cx="0" cy="0"/>
-          <a:chOff x="0" y="0"/>
-          <a:chExt cx="0" cy="0"/>
-        </a:xfrm>
-      </p:grpSpPr>
-      <p:sp>
-        <p:nvSpPr>
-          <p:cNvPr id="2" name="Foliennummernplatzhalter 1"/>
-          <p:cNvSpPr>
-            <a:spLocks noGrp="1"/>
-          </p:cNvSpPr>
-          <p:nvPr>
-            <p:ph type="sldNum" sz="quarter" idx="13"/>
-          </p:nvPr>
-        </p:nvSpPr>
-        <p:spPr/>
-        <p:txBody>
-          <a:bodyPr/>
-          <a:lstStyle/>
-          <a:p>
-            <a:fld id="{2E430B67-9B8D-45F2-8BD0-7EEC5CABEC81}" type="slidenum">
-              <a:rPr lang="de-DE" smtClean="0"/>
-              <a:pPr/>
-              <a:t>39</a:t>
-            </a:fld>
-            <a:endParaRPr lang="de-DE"/>
-          </a:p>
-        </p:txBody>
-      </p:sp>
-      <p:sp>
-        <p:nvSpPr>
-          <p:cNvPr id="3" name="Textplatzhalter 2"/>
-          <p:cNvSpPr>
-            <a:spLocks noGrp="1"/>
-          </p:cNvSpPr>
-          <p:nvPr>
-            <p:ph type="body" sz="quarter" idx="17"/>
-          </p:nvPr>
-        </p:nvSpPr>
-        <p:spPr/>
-        <p:txBody>
-          <a:bodyPr/>
-          <a:lstStyle/>
-          <a:p>
-            <a:endParaRPr lang="de-DE" dirty="0"/>
-          </a:p>
-        </p:txBody>
-      </p:sp>
-      <p:sp>
-        <p:nvSpPr>
-          <p:cNvPr id="4" name="Textplatzhalter 3"/>
-          <p:cNvSpPr>
-            <a:spLocks noGrp="1"/>
-          </p:cNvSpPr>
-          <p:nvPr>
-            <p:ph type="body" sz="quarter" idx="11"/>
-          </p:nvPr>
-        </p:nvSpPr>
-        <p:spPr/>
-        <p:txBody>
-          <a:bodyPr/>
-          <a:lstStyle/>
-          <a:p>
-            <a:endParaRPr lang="de-DE"/>
-          </a:p>
-        </p:txBody>
-      </p:sp>
-      <p:sp>
-        <p:nvSpPr>
-          <p:cNvPr id="5" name="Titel 4"/>
-          <p:cNvSpPr>
-            <a:spLocks noGrp="1"/>
-          </p:cNvSpPr>
-          <p:nvPr>
-            <p:ph type="title"/>
-          </p:nvPr>
-        </p:nvSpPr>
-        <p:spPr/>
-        <p:txBody>
-          <a:bodyPr/>
-          <a:lstStyle/>
-          <a:p>
-            <a:r>
-              <a:rPr lang="de-DE" dirty="0"/>
-              <a:t>Git-Kommandozeilenbefehle</a:t>
-            </a:r>
-          </a:p>
-        </p:txBody>
-      </p:sp>
-    </p:spTree>
-    <p:extLst>
-      <p:ext uri="{BB962C8B-B14F-4D97-AF65-F5344CB8AC3E}">
-        <p14:creationId xmlns:p14="http://schemas.microsoft.com/office/powerpoint/2010/main" val="2661074306"/>
       </p:ext>
     </p:extLst>
   </p:cSld>
@@ -44184,6 +44500,244 @@
       </p:sp>
       <p:sp>
         <p:nvSpPr>
+          <p:cNvPr id="3" name="Textplatzhalter 2"/>
+          <p:cNvSpPr>
+            <a:spLocks noGrp="1"/>
+          </p:cNvSpPr>
+          <p:nvPr>
+            <p:ph type="body" sz="quarter" idx="17"/>
+          </p:nvPr>
+        </p:nvSpPr>
+        <p:spPr/>
+        <p:txBody>
+          <a:bodyPr/>
+          <a:lstStyle/>
+          <a:p>
+            <a:endParaRPr lang="de-DE" dirty="0"/>
+          </a:p>
+        </p:txBody>
+      </p:sp>
+      <p:sp>
+        <p:nvSpPr>
+          <p:cNvPr id="4" name="Textplatzhalter 3"/>
+          <p:cNvSpPr>
+            <a:spLocks noGrp="1"/>
+          </p:cNvSpPr>
+          <p:nvPr>
+            <p:ph type="body" sz="quarter" idx="11"/>
+          </p:nvPr>
+        </p:nvSpPr>
+        <p:spPr/>
+        <p:txBody>
+          <a:bodyPr/>
+          <a:lstStyle/>
+          <a:p>
+            <a:endParaRPr lang="de-DE"/>
+          </a:p>
+        </p:txBody>
+      </p:sp>
+      <p:sp>
+        <p:nvSpPr>
+          <p:cNvPr id="5" name="Titel 4"/>
+          <p:cNvSpPr>
+            <a:spLocks noGrp="1"/>
+          </p:cNvSpPr>
+          <p:nvPr>
+            <p:ph type="title"/>
+          </p:nvPr>
+        </p:nvSpPr>
+        <p:spPr/>
+        <p:txBody>
+          <a:bodyPr/>
+          <a:lstStyle/>
+          <a:p>
+            <a:r>
+              <a:rPr lang="de-DE" dirty="0"/>
+              <a:t>Git-Kommandozeilenbefehle</a:t>
+            </a:r>
+          </a:p>
+        </p:txBody>
+      </p:sp>
+    </p:spTree>
+    <p:extLst>
+      <p:ext uri="{BB962C8B-B14F-4D97-AF65-F5344CB8AC3E}">
+        <p14:creationId xmlns:p14="http://schemas.microsoft.com/office/powerpoint/2010/main" val="2661074306"/>
+      </p:ext>
+    </p:extLst>
+  </p:cSld>
+  <p:clrMapOvr>
+    <a:masterClrMapping/>
+  </p:clrMapOvr>
+  <p:transition/>
+</p:sld>
+</file>
+
+<file path=ppt/slides/slide41.xml><?xml version="1.0" encoding="utf-8"?>
+<p:sld xmlns:a="http://schemas.openxmlformats.org/drawingml/2006/main" xmlns:r="http://schemas.openxmlformats.org/officeDocument/2006/relationships" xmlns:p="http://schemas.openxmlformats.org/presentationml/2006/main">
+  <p:cSld>
+    <p:spTree>
+      <p:nvGrpSpPr>
+        <p:cNvPr id="1" name=""/>
+        <p:cNvGrpSpPr/>
+        <p:nvPr/>
+      </p:nvGrpSpPr>
+      <p:grpSpPr>
+        <a:xfrm>
+          <a:off x="0" y="0"/>
+          <a:ext cx="0" cy="0"/>
+          <a:chOff x="0" y="0"/>
+          <a:chExt cx="0" cy="0"/>
+        </a:xfrm>
+      </p:grpSpPr>
+      <p:sp>
+        <p:nvSpPr>
+          <p:cNvPr id="2" name="Foliennummernplatzhalter 1"/>
+          <p:cNvSpPr>
+            <a:spLocks noGrp="1"/>
+          </p:cNvSpPr>
+          <p:nvPr>
+            <p:ph type="sldNum" sz="quarter" idx="13"/>
+          </p:nvPr>
+        </p:nvSpPr>
+        <p:spPr/>
+        <p:txBody>
+          <a:bodyPr/>
+          <a:lstStyle/>
+          <a:p>
+            <a:fld id="{2E430B67-9B8D-45F2-8BD0-7EEC5CABEC81}" type="slidenum">
+              <a:rPr lang="de-DE" smtClean="0"/>
+              <a:pPr/>
+              <a:t>41</a:t>
+            </a:fld>
+            <a:endParaRPr lang="de-DE"/>
+          </a:p>
+        </p:txBody>
+      </p:sp>
+      <p:sp>
+        <p:nvSpPr>
+          <p:cNvPr id="3" name="Textplatzhalter 2"/>
+          <p:cNvSpPr>
+            <a:spLocks noGrp="1"/>
+          </p:cNvSpPr>
+          <p:nvPr>
+            <p:ph type="body" sz="quarter" idx="17"/>
+          </p:nvPr>
+        </p:nvSpPr>
+        <p:spPr/>
+        <p:txBody>
+          <a:bodyPr/>
+          <a:lstStyle/>
+          <a:p>
+            <a:endParaRPr lang="de-DE"/>
+          </a:p>
+        </p:txBody>
+      </p:sp>
+      <p:sp>
+        <p:nvSpPr>
+          <p:cNvPr id="4" name="Textplatzhalter 3"/>
+          <p:cNvSpPr>
+            <a:spLocks noGrp="1"/>
+          </p:cNvSpPr>
+          <p:nvPr>
+            <p:ph type="body" sz="quarter" idx="11"/>
+          </p:nvPr>
+        </p:nvSpPr>
+        <p:spPr/>
+        <p:txBody>
+          <a:bodyPr/>
+          <a:lstStyle/>
+          <a:p>
+            <a:endParaRPr lang="de-DE"/>
+          </a:p>
+        </p:txBody>
+      </p:sp>
+      <p:sp>
+        <p:nvSpPr>
+          <p:cNvPr id="5" name="Titel 4"/>
+          <p:cNvSpPr>
+            <a:spLocks noGrp="1"/>
+          </p:cNvSpPr>
+          <p:nvPr>
+            <p:ph type="title"/>
+          </p:nvPr>
+        </p:nvSpPr>
+        <p:spPr/>
+        <p:txBody>
+          <a:bodyPr/>
+          <a:lstStyle/>
+          <a:p>
+            <a:r>
+              <a:rPr lang="de-DE" dirty="0"/>
+              <a:t>Weitere Vor- und Nachteile von </a:t>
+            </a:r>
+            <a:r>
+              <a:rPr lang="de-DE" dirty="0" err="1"/>
+              <a:t>Git</a:t>
+            </a:r>
+            <a:r>
+              <a:rPr lang="de-DE" dirty="0"/>
+              <a:t> und SVN</a:t>
+            </a:r>
+          </a:p>
+        </p:txBody>
+      </p:sp>
+    </p:spTree>
+    <p:extLst>
+      <p:ext uri="{BB962C8B-B14F-4D97-AF65-F5344CB8AC3E}">
+        <p14:creationId xmlns:p14="http://schemas.microsoft.com/office/powerpoint/2010/main" val="3539697911"/>
+      </p:ext>
+    </p:extLst>
+  </p:cSld>
+  <p:clrMapOvr>
+    <a:masterClrMapping/>
+  </p:clrMapOvr>
+  <p:transition/>
+</p:sld>
+</file>
+
+<file path=ppt/slides/slide42.xml><?xml version="1.0" encoding="utf-8"?>
+<p:sld xmlns:a="http://schemas.openxmlformats.org/drawingml/2006/main" xmlns:r="http://schemas.openxmlformats.org/officeDocument/2006/relationships" xmlns:p="http://schemas.openxmlformats.org/presentationml/2006/main">
+  <p:cSld>
+    <p:spTree>
+      <p:nvGrpSpPr>
+        <p:cNvPr id="1" name=""/>
+        <p:cNvGrpSpPr/>
+        <p:nvPr/>
+      </p:nvGrpSpPr>
+      <p:grpSpPr>
+        <a:xfrm>
+          <a:off x="0" y="0"/>
+          <a:ext cx="0" cy="0"/>
+          <a:chOff x="0" y="0"/>
+          <a:chExt cx="0" cy="0"/>
+        </a:xfrm>
+      </p:grpSpPr>
+      <p:sp>
+        <p:nvSpPr>
+          <p:cNvPr id="2" name="Foliennummernplatzhalter 1"/>
+          <p:cNvSpPr>
+            <a:spLocks noGrp="1"/>
+          </p:cNvSpPr>
+          <p:nvPr>
+            <p:ph type="sldNum" sz="quarter" idx="13"/>
+          </p:nvPr>
+        </p:nvSpPr>
+        <p:spPr/>
+        <p:txBody>
+          <a:bodyPr/>
+          <a:lstStyle/>
+          <a:p>
+            <a:fld id="{2E430B67-9B8D-45F2-8BD0-7EEC5CABEC81}" type="slidenum">
+              <a:rPr lang="de-DE" smtClean="0"/>
+              <a:pPr/>
+              <a:t>42</a:t>
+            </a:fld>
+            <a:endParaRPr lang="de-DE"/>
+          </a:p>
+        </p:txBody>
+      </p:sp>
+      <p:sp>
+        <p:nvSpPr>
           <p:cNvPr id="6" name="Textplatzhalter 5"/>
           <p:cNvSpPr>
             <a:spLocks noGrp="1"/>
@@ -44291,7 +44845,7 @@
 </p:sld>
 </file>
 
-<file path=ppt/slides/slide41.xml><?xml version="1.0" encoding="utf-8"?>
+<file path=ppt/slides/slide43.xml><?xml version="1.0" encoding="utf-8"?>
 <p:sld xmlns:a="http://schemas.openxmlformats.org/drawingml/2006/main" xmlns:r="http://schemas.openxmlformats.org/officeDocument/2006/relationships" xmlns:p="http://schemas.openxmlformats.org/presentationml/2006/main">
   <p:cSld>
     <p:spTree>
@@ -44326,7 +44880,7 @@
             <a:fld id="{2E430B67-9B8D-45F2-8BD0-7EEC5CABEC81}" type="slidenum">
               <a:rPr lang="de-DE" smtClean="0"/>
               <a:pPr/>
-              <a:t>41</a:t>
+              <a:t>43</a:t>
             </a:fld>
             <a:endParaRPr lang="de-DE"/>
           </a:p>
@@ -44415,435 +44969,6 @@
 </p:sld>
 </file>
 
-<file path=ppt/slides/slide42.xml><?xml version="1.0" encoding="utf-8"?>
-<p:sld xmlns:a="http://schemas.openxmlformats.org/drawingml/2006/main" xmlns:r="http://schemas.openxmlformats.org/officeDocument/2006/relationships" xmlns:p="http://schemas.openxmlformats.org/presentationml/2006/main">
-  <p:cSld>
-    <p:spTree>
-      <p:nvGrpSpPr>
-        <p:cNvPr id="1" name=""/>
-        <p:cNvGrpSpPr/>
-        <p:nvPr/>
-      </p:nvGrpSpPr>
-      <p:grpSpPr>
-        <a:xfrm>
-          <a:off x="0" y="0"/>
-          <a:ext cx="0" cy="0"/>
-          <a:chOff x="0" y="0"/>
-          <a:chExt cx="0" cy="0"/>
-        </a:xfrm>
-      </p:grpSpPr>
-      <p:sp>
-        <p:nvSpPr>
-          <p:cNvPr id="2" name="Foliennummernplatzhalter 1"/>
-          <p:cNvSpPr>
-            <a:spLocks noGrp="1"/>
-          </p:cNvSpPr>
-          <p:nvPr>
-            <p:ph type="sldNum" sz="quarter" idx="13"/>
-          </p:nvPr>
-        </p:nvSpPr>
-        <p:spPr/>
-        <p:txBody>
-          <a:bodyPr/>
-          <a:lstStyle/>
-          <a:p>
-            <a:fld id="{2E430B67-9B8D-45F2-8BD0-7EEC5CABEC81}" type="slidenum">
-              <a:rPr lang="de-DE" smtClean="0"/>
-              <a:pPr/>
-              <a:t>42</a:t>
-            </a:fld>
-            <a:endParaRPr lang="de-DE"/>
-          </a:p>
-        </p:txBody>
-      </p:sp>
-      <p:sp>
-        <p:nvSpPr>
-          <p:cNvPr id="3" name="Textplatzhalter 2"/>
-          <p:cNvSpPr>
-            <a:spLocks noGrp="1"/>
-          </p:cNvSpPr>
-          <p:nvPr>
-            <p:ph type="body" sz="quarter" idx="17"/>
-          </p:nvPr>
-        </p:nvSpPr>
-        <p:spPr/>
-        <p:txBody>
-          <a:bodyPr/>
-          <a:lstStyle/>
-          <a:p>
-            <a:pPr marL="285750" indent="-285750">
-              <a:buFontTx/>
-              <a:buChar char="-"/>
-            </a:pPr>
-            <a:r>
-              <a:rPr lang="de-DE" dirty="0"/>
-              <a:t>Befehl: </a:t>
-            </a:r>
-            <a:r>
-              <a:rPr lang="de-DE" dirty="0" err="1"/>
-              <a:t>git</a:t>
-            </a:r>
-            <a:r>
-              <a:rPr lang="de-DE" dirty="0"/>
-              <a:t> </a:t>
-            </a:r>
-            <a:r>
-              <a:rPr lang="de-DE" dirty="0" err="1"/>
-              <a:t>svn</a:t>
-            </a:r>
-            <a:endParaRPr lang="de-DE" dirty="0"/>
-          </a:p>
-          <a:p>
-            <a:pPr marL="285750" indent="-285750">
-              <a:buFontTx/>
-              <a:buChar char="-"/>
-            </a:pPr>
-            <a:r>
-              <a:rPr lang="de-DE" dirty="0"/>
-              <a:t>Git als Client für einen Subversion-Server</a:t>
-            </a:r>
-          </a:p>
-          <a:p>
-            <a:pPr marL="285750" indent="-285750">
-              <a:buFontTx/>
-              <a:buChar char="-"/>
-            </a:pPr>
-            <a:r>
-              <a:rPr lang="de-DE" dirty="0"/>
-              <a:t>lokalen Features von Git (lokale </a:t>
-            </a:r>
-            <a:r>
-              <a:rPr lang="de-DE" dirty="0" err="1"/>
-              <a:t>Branches</a:t>
-            </a:r>
-            <a:r>
-              <a:rPr lang="de-DE" dirty="0"/>
-              <a:t>, </a:t>
-            </a:r>
-            <a:r>
-              <a:rPr lang="de-DE" dirty="0" err="1"/>
-              <a:t>mergen</a:t>
-            </a:r>
-            <a:r>
-              <a:rPr lang="de-DE" dirty="0"/>
-              <a:t>, </a:t>
-            </a:r>
-            <a:r>
-              <a:rPr lang="de-DE" dirty="0" err="1"/>
-              <a:t>staging</a:t>
-            </a:r>
-            <a:r>
-              <a:rPr lang="de-DE" dirty="0"/>
-              <a:t> </a:t>
-            </a:r>
-            <a:r>
-              <a:rPr lang="de-DE" dirty="0" err="1"/>
-              <a:t>area</a:t>
-            </a:r>
-            <a:r>
-              <a:rPr lang="de-DE" dirty="0"/>
-              <a:t>, etc.) verwenden</a:t>
-            </a:r>
-          </a:p>
-          <a:p>
-            <a:pPr marL="285750" indent="-285750">
-              <a:buFontTx/>
-              <a:buChar char="-"/>
-            </a:pPr>
-            <a:r>
-              <a:rPr lang="de-DE" dirty="0"/>
-              <a:t>Push auf Subversion Server</a:t>
-            </a:r>
-          </a:p>
-          <a:p>
-            <a:pPr marL="285750" indent="-285750">
-              <a:buFontTx/>
-              <a:buChar char="-"/>
-            </a:pPr>
-            <a:r>
-              <a:rPr lang="de-DE" dirty="0"/>
-              <a:t>gute Möglichkeit Git in einem Unternehmen einzuführen</a:t>
-            </a:r>
-          </a:p>
-          <a:p>
-            <a:pPr marL="285750" indent="-285750">
-              <a:buFontTx/>
-              <a:buChar char="-"/>
-            </a:pPr>
-            <a:endParaRPr lang="de-DE" dirty="0"/>
-          </a:p>
-        </p:txBody>
-      </p:sp>
-      <p:sp>
-        <p:nvSpPr>
-          <p:cNvPr id="4" name="Textplatzhalter 3"/>
-          <p:cNvSpPr>
-            <a:spLocks noGrp="1"/>
-          </p:cNvSpPr>
-          <p:nvPr>
-            <p:ph type="body" sz="quarter" idx="11"/>
-          </p:nvPr>
-        </p:nvSpPr>
-        <p:spPr/>
-        <p:txBody>
-          <a:bodyPr/>
-          <a:lstStyle/>
-          <a:p>
-            <a:endParaRPr lang="de-DE"/>
-          </a:p>
-        </p:txBody>
-      </p:sp>
-      <p:sp>
-        <p:nvSpPr>
-          <p:cNvPr id="5" name="Titel 4"/>
-          <p:cNvSpPr>
-            <a:spLocks noGrp="1"/>
-          </p:cNvSpPr>
-          <p:nvPr>
-            <p:ph type="title"/>
-          </p:nvPr>
-        </p:nvSpPr>
-        <p:spPr/>
-        <p:txBody>
-          <a:bodyPr/>
-          <a:lstStyle/>
-          <a:p>
-            <a:r>
-              <a:rPr lang="de-DE" dirty="0"/>
-              <a:t>Git: Bi-direktionale Brücke zu SVN</a:t>
-            </a:r>
-          </a:p>
-        </p:txBody>
-      </p:sp>
-    </p:spTree>
-    <p:extLst>
-      <p:ext uri="{BB962C8B-B14F-4D97-AF65-F5344CB8AC3E}">
-        <p14:creationId xmlns:p14="http://schemas.microsoft.com/office/powerpoint/2010/main" val="3505363922"/>
-      </p:ext>
-    </p:extLst>
-  </p:cSld>
-  <p:clrMapOvr>
-    <a:masterClrMapping/>
-  </p:clrMapOvr>
-  <p:transition/>
-</p:sld>
-</file>
-
-<file path=ppt/slides/slide43.xml><?xml version="1.0" encoding="utf-8"?>
-<p:sld xmlns:a="http://schemas.openxmlformats.org/drawingml/2006/main" xmlns:r="http://schemas.openxmlformats.org/officeDocument/2006/relationships" xmlns:p="http://schemas.openxmlformats.org/presentationml/2006/main">
-  <p:cSld>
-    <p:spTree>
-      <p:nvGrpSpPr>
-        <p:cNvPr id="1" name=""/>
-        <p:cNvGrpSpPr/>
-        <p:nvPr/>
-      </p:nvGrpSpPr>
-      <p:grpSpPr>
-        <a:xfrm>
-          <a:off x="0" y="0"/>
-          <a:ext cx="0" cy="0"/>
-          <a:chOff x="0" y="0"/>
-          <a:chExt cx="0" cy="0"/>
-        </a:xfrm>
-      </p:grpSpPr>
-      <p:sp>
-        <p:nvSpPr>
-          <p:cNvPr id="2" name="Foliennummernplatzhalter 1"/>
-          <p:cNvSpPr>
-            <a:spLocks noGrp="1"/>
-          </p:cNvSpPr>
-          <p:nvPr>
-            <p:ph type="sldNum" sz="quarter" idx="13"/>
-          </p:nvPr>
-        </p:nvSpPr>
-        <p:spPr/>
-        <p:txBody>
-          <a:bodyPr/>
-          <a:lstStyle/>
-          <a:p>
-            <a:fld id="{2E430B67-9B8D-45F2-8BD0-7EEC5CABEC81}" type="slidenum">
-              <a:rPr lang="de-DE" smtClean="0"/>
-              <a:pPr/>
-              <a:t>43</a:t>
-            </a:fld>
-            <a:endParaRPr lang="de-DE"/>
-          </a:p>
-        </p:txBody>
-      </p:sp>
-      <p:sp>
-        <p:nvSpPr>
-          <p:cNvPr id="3" name="Textplatzhalter 2"/>
-          <p:cNvSpPr>
-            <a:spLocks noGrp="1"/>
-          </p:cNvSpPr>
-          <p:nvPr>
-            <p:ph type="body" sz="quarter" idx="17"/>
-          </p:nvPr>
-        </p:nvSpPr>
-        <p:spPr/>
-        <p:txBody>
-          <a:bodyPr/>
-          <a:lstStyle/>
-          <a:p>
-            <a:pPr marL="285750" indent="-285750">
-              <a:buFontTx/>
-              <a:buChar char="-"/>
-            </a:pPr>
-            <a:r>
-              <a:rPr lang="de-DE" dirty="0"/>
-              <a:t>Grundsätzlich kann jeder Git weiterentwickeln</a:t>
-            </a:r>
-          </a:p>
-          <a:p>
-            <a:pPr marL="285750" indent="-285750">
-              <a:buFontTx/>
-              <a:buChar char="-"/>
-            </a:pPr>
-            <a:r>
-              <a:rPr lang="de-DE" dirty="0"/>
-              <a:t>Dazu gibt es ein „</a:t>
-            </a:r>
-            <a:r>
-              <a:rPr lang="de-DE" dirty="0" err="1"/>
-              <a:t>How</a:t>
-            </a:r>
-            <a:r>
-              <a:rPr lang="de-DE" dirty="0"/>
-              <a:t> </a:t>
-            </a:r>
-            <a:r>
-              <a:rPr lang="de-DE" dirty="0" err="1"/>
-              <a:t>to</a:t>
-            </a:r>
-            <a:r>
-              <a:rPr lang="de-DE" dirty="0"/>
-              <a:t> </a:t>
-            </a:r>
-            <a:r>
-              <a:rPr lang="de-DE" dirty="0" err="1"/>
-              <a:t>maintain</a:t>
-            </a:r>
-            <a:r>
-              <a:rPr lang="de-DE" dirty="0"/>
-              <a:t> Git“</a:t>
-            </a:r>
-          </a:p>
-          <a:p>
-            <a:pPr marL="285750" indent="-285750">
-              <a:buFontTx/>
-              <a:buChar char="-"/>
-            </a:pPr>
-            <a:r>
-              <a:rPr lang="de-DE" dirty="0"/>
-              <a:t>Über die „Git </a:t>
-            </a:r>
-            <a:r>
-              <a:rPr lang="de-DE" dirty="0" err="1"/>
-              <a:t>mailing</a:t>
-            </a:r>
-            <a:r>
-              <a:rPr lang="de-DE" dirty="0"/>
-              <a:t> </a:t>
-            </a:r>
-            <a:r>
-              <a:rPr lang="de-DE" dirty="0" err="1"/>
-              <a:t>list</a:t>
-            </a:r>
-            <a:r>
-              <a:rPr lang="de-DE" dirty="0"/>
-              <a:t>“ kann man dann mit den Git Entwicklern in Kontakt treten</a:t>
-            </a:r>
-          </a:p>
-          <a:p>
-            <a:pPr marL="285750" indent="-285750">
-              <a:buFontTx/>
-              <a:buChar char="-"/>
-            </a:pPr>
-            <a:r>
-              <a:rPr lang="de-DE" dirty="0">
-                <a:hlinkClick r:id="rId2"/>
-              </a:rPr>
-              <a:t>https://www.kernel.org/pub/software/scm/git/docs/howto/maintain-git.html</a:t>
-            </a:r>
-            <a:endParaRPr lang="de-DE" dirty="0"/>
-          </a:p>
-          <a:p>
-            <a:pPr marL="285750" indent="-285750">
-              <a:buFontTx/>
-              <a:buChar char="-"/>
-            </a:pPr>
-            <a:r>
-              <a:rPr lang="de-DE" dirty="0">
-                <a:hlinkClick r:id="rId3"/>
-              </a:rPr>
-              <a:t>http://de.gitready.com/beginner/2009/03/02/where-to-find-the-git-community.html</a:t>
-            </a:r>
-            <a:endParaRPr lang="de-DE" dirty="0"/>
-          </a:p>
-          <a:p>
-            <a:pPr marL="285750" indent="-285750">
-              <a:buFontTx/>
-              <a:buChar char="-"/>
-            </a:pPr>
-            <a:endParaRPr lang="de-DE" dirty="0"/>
-          </a:p>
-        </p:txBody>
-      </p:sp>
-      <p:sp>
-        <p:nvSpPr>
-          <p:cNvPr id="4" name="Textplatzhalter 3"/>
-          <p:cNvSpPr>
-            <a:spLocks noGrp="1"/>
-          </p:cNvSpPr>
-          <p:nvPr>
-            <p:ph type="body" sz="quarter" idx="11"/>
-          </p:nvPr>
-        </p:nvSpPr>
-        <p:spPr/>
-        <p:txBody>
-          <a:bodyPr/>
-          <a:lstStyle/>
-          <a:p>
-            <a:endParaRPr lang="de-DE"/>
-          </a:p>
-        </p:txBody>
-      </p:sp>
-      <p:sp>
-        <p:nvSpPr>
-          <p:cNvPr id="5" name="Titel 4"/>
-          <p:cNvSpPr>
-            <a:spLocks noGrp="1"/>
-          </p:cNvSpPr>
-          <p:nvPr>
-            <p:ph type="title"/>
-          </p:nvPr>
-        </p:nvSpPr>
-        <p:spPr/>
-        <p:txBody>
-          <a:bodyPr/>
-          <a:lstStyle/>
-          <a:p>
-            <a:r>
-              <a:rPr lang="de-DE" dirty="0"/>
-              <a:t>Weiterentwicklung von Git</a:t>
-            </a:r>
-          </a:p>
-        </p:txBody>
-      </p:sp>
-    </p:spTree>
-    <p:extLst>
-      <p:ext uri="{BB962C8B-B14F-4D97-AF65-F5344CB8AC3E}">
-        <p14:creationId xmlns:p14="http://schemas.microsoft.com/office/powerpoint/2010/main" val="370680181"/>
-      </p:ext>
-    </p:extLst>
-  </p:cSld>
-  <p:clrMapOvr>
-    <a:masterClrMapping/>
-  </p:clrMapOvr>
-  <p:transition/>
-</p:sld>
-</file>
-
 <file path=ppt/slides/slide44.xml><?xml version="1.0" encoding="utf-8"?>
 <p:sld xmlns:a="http://schemas.openxmlformats.org/drawingml/2006/main" xmlns:r="http://schemas.openxmlformats.org/officeDocument/2006/relationships" xmlns:p="http://schemas.openxmlformats.org/presentationml/2006/main">
   <p:cSld>
@@ -44887,7 +45012,7 @@
       </p:sp>
       <p:sp>
         <p:nvSpPr>
-          <p:cNvPr id="8" name="Textplatzhalter 7"/>
+          <p:cNvPr id="3" name="Textplatzhalter 2"/>
           <p:cNvSpPr>
             <a:spLocks noGrp="1"/>
           </p:cNvSpPr>
@@ -44906,8 +45031,21 @@
             </a:pPr>
             <a:r>
               <a:rPr lang="de-DE" dirty="0"/>
-              <a:t>Webserver Authentifizierung (Apache)</a:t>
-            </a:r>
+              <a:t>Befehl: </a:t>
+            </a:r>
+            <a:r>
+              <a:rPr lang="de-DE" dirty="0" err="1"/>
+              <a:t>git</a:t>
+            </a:r>
+            <a:r>
+              <a:rPr lang="de-DE" dirty="0"/>
+              <a:t> </a:t>
+            </a:r>
+            <a:r>
+              <a:rPr lang="de-DE" dirty="0" err="1"/>
+              <a:t>svn</a:t>
+            </a:r>
+            <a:endParaRPr lang="de-DE" dirty="0"/>
           </a:p>
           <a:p>
             <a:pPr marL="285750" indent="-285750">
@@ -44916,7 +45054,69 @@
             </a:pPr>
             <a:r>
               <a:rPr lang="de-DE" dirty="0"/>
-              <a:t>SSH (Secure Shell)</a:t>
+              <a:t>Git als Client für einen Subversion-Server</a:t>
+            </a:r>
+          </a:p>
+          <a:p>
+            <a:pPr marL="285750" indent="-285750">
+              <a:buFontTx/>
+              <a:buChar char="-"/>
+            </a:pPr>
+            <a:r>
+              <a:rPr lang="de-DE" dirty="0"/>
+              <a:t>lokalen Features von Git (lokale </a:t>
+            </a:r>
+            <a:r>
+              <a:rPr lang="de-DE" dirty="0" err="1"/>
+              <a:t>Branches</a:t>
+            </a:r>
+            <a:r>
+              <a:rPr lang="de-DE" dirty="0"/>
+              <a:t>, </a:t>
+            </a:r>
+            <a:r>
+              <a:rPr lang="de-DE" dirty="0" err="1"/>
+              <a:t>mergen</a:t>
+            </a:r>
+            <a:r>
+              <a:rPr lang="de-DE" dirty="0"/>
+              <a:t>, </a:t>
+            </a:r>
+            <a:r>
+              <a:rPr lang="de-DE" dirty="0" err="1"/>
+              <a:t>staging</a:t>
+            </a:r>
+            <a:r>
+              <a:rPr lang="de-DE" dirty="0"/>
+              <a:t> </a:t>
+            </a:r>
+            <a:r>
+              <a:rPr lang="de-DE" dirty="0" err="1"/>
+              <a:t>area</a:t>
+            </a:r>
+            <a:r>
+              <a:rPr lang="de-DE" dirty="0"/>
+              <a:t>, etc.) verwenden</a:t>
+            </a:r>
+          </a:p>
+          <a:p>
+            <a:pPr marL="285750" indent="-285750">
+              <a:buFontTx/>
+              <a:buChar char="-"/>
+            </a:pPr>
+            <a:r>
+              <a:rPr lang="de-DE" dirty="0"/>
+              <a:t>Push auf Subversion Server</a:t>
+            </a:r>
+          </a:p>
+          <a:p>
+            <a:pPr marL="285750" indent="-285750">
+              <a:buFontTx/>
+              <a:buChar char="-"/>
+            </a:pPr>
+            <a:r>
+              <a:rPr lang="de-DE" dirty="0"/>
+              <a:t>gute Möglichkeit Git in einem Unternehmen einzuführen</a:t>
             </a:r>
           </a:p>
           <a:p>
@@ -44926,14 +45126,11 @@
             </a:pPr>
             <a:endParaRPr lang="de-DE" dirty="0"/>
           </a:p>
-          <a:p>
-            <a:endParaRPr lang="de-DE" dirty="0"/>
-          </a:p>
-        </p:txBody>
-      </p:sp>
-      <p:sp>
-        <p:nvSpPr>
-          <p:cNvPr id="7" name="Textplatzhalter 6"/>
+        </p:txBody>
+      </p:sp>
+      <p:sp>
+        <p:nvSpPr>
+          <p:cNvPr id="4" name="Textplatzhalter 3"/>
           <p:cNvSpPr>
             <a:spLocks noGrp="1"/>
           </p:cNvSpPr>
@@ -44952,7 +45149,7 @@
       </p:sp>
       <p:sp>
         <p:nvSpPr>
-          <p:cNvPr id="6" name="Titel 5"/>
+          <p:cNvPr id="5" name="Titel 4"/>
           <p:cNvSpPr>
             <a:spLocks noGrp="1"/>
           </p:cNvSpPr>
@@ -44967,7 +45164,7 @@
           <a:p>
             <a:r>
               <a:rPr lang="de-DE" dirty="0"/>
-              <a:t>Git Authentifizierung</a:t>
+              <a:t>Git: Bi-direktionale Brücke zu SVN</a:t>
             </a:r>
           </a:p>
         </p:txBody>
@@ -44975,7 +45172,7 @@
     </p:spTree>
     <p:extLst>
       <p:ext uri="{BB962C8B-B14F-4D97-AF65-F5344CB8AC3E}">
-        <p14:creationId xmlns:p14="http://schemas.microsoft.com/office/powerpoint/2010/main" val="360136151"/>
+        <p14:creationId xmlns:p14="http://schemas.microsoft.com/office/powerpoint/2010/main" val="3505363922"/>
       </p:ext>
     </p:extLst>
   </p:cSld>
@@ -45022,6 +45219,363 @@
               <a:rPr lang="de-DE" smtClean="0"/>
               <a:pPr/>
               <a:t>45</a:t>
+            </a:fld>
+            <a:endParaRPr lang="de-DE"/>
+          </a:p>
+        </p:txBody>
+      </p:sp>
+      <p:sp>
+        <p:nvSpPr>
+          <p:cNvPr id="3" name="Textplatzhalter 2"/>
+          <p:cNvSpPr>
+            <a:spLocks noGrp="1"/>
+          </p:cNvSpPr>
+          <p:nvPr>
+            <p:ph type="body" sz="quarter" idx="17"/>
+          </p:nvPr>
+        </p:nvSpPr>
+        <p:spPr/>
+        <p:txBody>
+          <a:bodyPr/>
+          <a:lstStyle/>
+          <a:p>
+            <a:pPr marL="285750" indent="-285750">
+              <a:buFontTx/>
+              <a:buChar char="-"/>
+            </a:pPr>
+            <a:r>
+              <a:rPr lang="de-DE" dirty="0"/>
+              <a:t>Grundsätzlich kann jeder Git weiterentwickeln</a:t>
+            </a:r>
+          </a:p>
+          <a:p>
+            <a:pPr marL="285750" indent="-285750">
+              <a:buFontTx/>
+              <a:buChar char="-"/>
+            </a:pPr>
+            <a:r>
+              <a:rPr lang="de-DE" dirty="0"/>
+              <a:t>Dazu gibt es ein „</a:t>
+            </a:r>
+            <a:r>
+              <a:rPr lang="de-DE" dirty="0" err="1"/>
+              <a:t>How</a:t>
+            </a:r>
+            <a:r>
+              <a:rPr lang="de-DE" dirty="0"/>
+              <a:t> </a:t>
+            </a:r>
+            <a:r>
+              <a:rPr lang="de-DE" dirty="0" err="1"/>
+              <a:t>to</a:t>
+            </a:r>
+            <a:r>
+              <a:rPr lang="de-DE" dirty="0"/>
+              <a:t> </a:t>
+            </a:r>
+            <a:r>
+              <a:rPr lang="de-DE" dirty="0" err="1"/>
+              <a:t>maintain</a:t>
+            </a:r>
+            <a:r>
+              <a:rPr lang="de-DE" dirty="0"/>
+              <a:t> Git“</a:t>
+            </a:r>
+          </a:p>
+          <a:p>
+            <a:pPr marL="285750" indent="-285750">
+              <a:buFontTx/>
+              <a:buChar char="-"/>
+            </a:pPr>
+            <a:r>
+              <a:rPr lang="de-DE" dirty="0"/>
+              <a:t>Über die „Git </a:t>
+            </a:r>
+            <a:r>
+              <a:rPr lang="de-DE" dirty="0" err="1"/>
+              <a:t>mailing</a:t>
+            </a:r>
+            <a:r>
+              <a:rPr lang="de-DE" dirty="0"/>
+              <a:t> </a:t>
+            </a:r>
+            <a:r>
+              <a:rPr lang="de-DE" dirty="0" err="1"/>
+              <a:t>list</a:t>
+            </a:r>
+            <a:r>
+              <a:rPr lang="de-DE" dirty="0"/>
+              <a:t>“ kann man dann mit den Git Entwicklern in Kontakt treten</a:t>
+            </a:r>
+          </a:p>
+          <a:p>
+            <a:pPr marL="285750" indent="-285750">
+              <a:buFontTx/>
+              <a:buChar char="-"/>
+            </a:pPr>
+            <a:r>
+              <a:rPr lang="de-DE" dirty="0">
+                <a:hlinkClick r:id="rId2"/>
+              </a:rPr>
+              <a:t>https://www.kernel.org/pub/software/scm/git/docs/howto/maintain-git.html</a:t>
+            </a:r>
+            <a:endParaRPr lang="de-DE" dirty="0"/>
+          </a:p>
+          <a:p>
+            <a:pPr marL="285750" indent="-285750">
+              <a:buFontTx/>
+              <a:buChar char="-"/>
+            </a:pPr>
+            <a:r>
+              <a:rPr lang="de-DE" dirty="0">
+                <a:hlinkClick r:id="rId3"/>
+              </a:rPr>
+              <a:t>http://de.gitready.com/beginner/2009/03/02/where-to-find-the-git-community.html</a:t>
+            </a:r>
+            <a:endParaRPr lang="de-DE" dirty="0"/>
+          </a:p>
+          <a:p>
+            <a:pPr marL="285750" indent="-285750">
+              <a:buFontTx/>
+              <a:buChar char="-"/>
+            </a:pPr>
+            <a:endParaRPr lang="de-DE" dirty="0"/>
+          </a:p>
+        </p:txBody>
+      </p:sp>
+      <p:sp>
+        <p:nvSpPr>
+          <p:cNvPr id="4" name="Textplatzhalter 3"/>
+          <p:cNvSpPr>
+            <a:spLocks noGrp="1"/>
+          </p:cNvSpPr>
+          <p:nvPr>
+            <p:ph type="body" sz="quarter" idx="11"/>
+          </p:nvPr>
+        </p:nvSpPr>
+        <p:spPr/>
+        <p:txBody>
+          <a:bodyPr/>
+          <a:lstStyle/>
+          <a:p>
+            <a:endParaRPr lang="de-DE"/>
+          </a:p>
+        </p:txBody>
+      </p:sp>
+      <p:sp>
+        <p:nvSpPr>
+          <p:cNvPr id="5" name="Titel 4"/>
+          <p:cNvSpPr>
+            <a:spLocks noGrp="1"/>
+          </p:cNvSpPr>
+          <p:nvPr>
+            <p:ph type="title"/>
+          </p:nvPr>
+        </p:nvSpPr>
+        <p:spPr/>
+        <p:txBody>
+          <a:bodyPr/>
+          <a:lstStyle/>
+          <a:p>
+            <a:r>
+              <a:rPr lang="de-DE" dirty="0"/>
+              <a:t>Weiterentwicklung von Git</a:t>
+            </a:r>
+          </a:p>
+        </p:txBody>
+      </p:sp>
+    </p:spTree>
+    <p:extLst>
+      <p:ext uri="{BB962C8B-B14F-4D97-AF65-F5344CB8AC3E}">
+        <p14:creationId xmlns:p14="http://schemas.microsoft.com/office/powerpoint/2010/main" val="370680181"/>
+      </p:ext>
+    </p:extLst>
+  </p:cSld>
+  <p:clrMapOvr>
+    <a:masterClrMapping/>
+  </p:clrMapOvr>
+  <p:transition/>
+</p:sld>
+</file>
+
+<file path=ppt/slides/slide46.xml><?xml version="1.0" encoding="utf-8"?>
+<p:sld xmlns:a="http://schemas.openxmlformats.org/drawingml/2006/main" xmlns:r="http://schemas.openxmlformats.org/officeDocument/2006/relationships" xmlns:p="http://schemas.openxmlformats.org/presentationml/2006/main">
+  <p:cSld>
+    <p:spTree>
+      <p:nvGrpSpPr>
+        <p:cNvPr id="1" name=""/>
+        <p:cNvGrpSpPr/>
+        <p:nvPr/>
+      </p:nvGrpSpPr>
+      <p:grpSpPr>
+        <a:xfrm>
+          <a:off x="0" y="0"/>
+          <a:ext cx="0" cy="0"/>
+          <a:chOff x="0" y="0"/>
+          <a:chExt cx="0" cy="0"/>
+        </a:xfrm>
+      </p:grpSpPr>
+      <p:sp>
+        <p:nvSpPr>
+          <p:cNvPr id="2" name="Foliennummernplatzhalter 1"/>
+          <p:cNvSpPr>
+            <a:spLocks noGrp="1"/>
+          </p:cNvSpPr>
+          <p:nvPr>
+            <p:ph type="sldNum" sz="quarter" idx="13"/>
+          </p:nvPr>
+        </p:nvSpPr>
+        <p:spPr/>
+        <p:txBody>
+          <a:bodyPr/>
+          <a:lstStyle/>
+          <a:p>
+            <a:fld id="{2E430B67-9B8D-45F2-8BD0-7EEC5CABEC81}" type="slidenum">
+              <a:rPr lang="de-DE" smtClean="0"/>
+              <a:pPr/>
+              <a:t>46</a:t>
+            </a:fld>
+            <a:endParaRPr lang="de-DE"/>
+          </a:p>
+        </p:txBody>
+      </p:sp>
+      <p:sp>
+        <p:nvSpPr>
+          <p:cNvPr id="8" name="Textplatzhalter 7"/>
+          <p:cNvSpPr>
+            <a:spLocks noGrp="1"/>
+          </p:cNvSpPr>
+          <p:nvPr>
+            <p:ph type="body" sz="quarter" idx="17"/>
+          </p:nvPr>
+        </p:nvSpPr>
+        <p:spPr/>
+        <p:txBody>
+          <a:bodyPr/>
+          <a:lstStyle/>
+          <a:p>
+            <a:pPr marL="285750" indent="-285750">
+              <a:buFontTx/>
+              <a:buChar char="-"/>
+            </a:pPr>
+            <a:r>
+              <a:rPr lang="de-DE" dirty="0"/>
+              <a:t>Webserver Authentifizierung (Apache)</a:t>
+            </a:r>
+          </a:p>
+          <a:p>
+            <a:pPr marL="285750" indent="-285750">
+              <a:buFontTx/>
+              <a:buChar char="-"/>
+            </a:pPr>
+            <a:r>
+              <a:rPr lang="de-DE" dirty="0"/>
+              <a:t>SSH (Secure Shell)</a:t>
+            </a:r>
+          </a:p>
+          <a:p>
+            <a:pPr marL="285750" indent="-285750">
+              <a:buFontTx/>
+              <a:buChar char="-"/>
+            </a:pPr>
+            <a:endParaRPr lang="de-DE" dirty="0"/>
+          </a:p>
+          <a:p>
+            <a:endParaRPr lang="de-DE" dirty="0"/>
+          </a:p>
+        </p:txBody>
+      </p:sp>
+      <p:sp>
+        <p:nvSpPr>
+          <p:cNvPr id="7" name="Textplatzhalter 6"/>
+          <p:cNvSpPr>
+            <a:spLocks noGrp="1"/>
+          </p:cNvSpPr>
+          <p:nvPr>
+            <p:ph type="body" sz="quarter" idx="11"/>
+          </p:nvPr>
+        </p:nvSpPr>
+        <p:spPr/>
+        <p:txBody>
+          <a:bodyPr/>
+          <a:lstStyle/>
+          <a:p>
+            <a:endParaRPr lang="de-DE"/>
+          </a:p>
+        </p:txBody>
+      </p:sp>
+      <p:sp>
+        <p:nvSpPr>
+          <p:cNvPr id="6" name="Titel 5"/>
+          <p:cNvSpPr>
+            <a:spLocks noGrp="1"/>
+          </p:cNvSpPr>
+          <p:nvPr>
+            <p:ph type="title"/>
+          </p:nvPr>
+        </p:nvSpPr>
+        <p:spPr/>
+        <p:txBody>
+          <a:bodyPr/>
+          <a:lstStyle/>
+          <a:p>
+            <a:r>
+              <a:rPr lang="de-DE" dirty="0"/>
+              <a:t>Git Authentifizierung</a:t>
+            </a:r>
+          </a:p>
+        </p:txBody>
+      </p:sp>
+    </p:spTree>
+    <p:extLst>
+      <p:ext uri="{BB962C8B-B14F-4D97-AF65-F5344CB8AC3E}">
+        <p14:creationId xmlns:p14="http://schemas.microsoft.com/office/powerpoint/2010/main" val="360136151"/>
+      </p:ext>
+    </p:extLst>
+  </p:cSld>
+  <p:clrMapOvr>
+    <a:masterClrMapping/>
+  </p:clrMapOvr>
+  <p:transition/>
+</p:sld>
+</file>
+
+<file path=ppt/slides/slide47.xml><?xml version="1.0" encoding="utf-8"?>
+<p:sld xmlns:a="http://schemas.openxmlformats.org/drawingml/2006/main" xmlns:r="http://schemas.openxmlformats.org/officeDocument/2006/relationships" xmlns:p="http://schemas.openxmlformats.org/presentationml/2006/main">
+  <p:cSld>
+    <p:spTree>
+      <p:nvGrpSpPr>
+        <p:cNvPr id="1" name=""/>
+        <p:cNvGrpSpPr/>
+        <p:nvPr/>
+      </p:nvGrpSpPr>
+      <p:grpSpPr>
+        <a:xfrm>
+          <a:off x="0" y="0"/>
+          <a:ext cx="0" cy="0"/>
+          <a:chOff x="0" y="0"/>
+          <a:chExt cx="0" cy="0"/>
+        </a:xfrm>
+      </p:grpSpPr>
+      <p:sp>
+        <p:nvSpPr>
+          <p:cNvPr id="2" name="Foliennummernplatzhalter 1"/>
+          <p:cNvSpPr>
+            <a:spLocks noGrp="1"/>
+          </p:cNvSpPr>
+          <p:nvPr>
+            <p:ph type="sldNum" sz="quarter" idx="13"/>
+          </p:nvPr>
+        </p:nvSpPr>
+        <p:spPr/>
+        <p:txBody>
+          <a:bodyPr/>
+          <a:lstStyle/>
+          <a:p>
+            <a:fld id="{2E430B67-9B8D-45F2-8BD0-7EEC5CABEC81}" type="slidenum">
+              <a:rPr lang="de-DE" smtClean="0"/>
+              <a:pPr/>
+              <a:t>47</a:t>
             </a:fld>
             <a:endParaRPr lang="de-DE"/>
           </a:p>
@@ -45195,7 +45749,7 @@
 </p:sld>
 </file>
 
-<file path=ppt/slides/slide46.xml><?xml version="1.0" encoding="utf-8"?>
+<file path=ppt/slides/slide48.xml><?xml version="1.0" encoding="utf-8"?>
 <p:sld xmlns:a="http://schemas.openxmlformats.org/drawingml/2006/main" xmlns:r="http://schemas.openxmlformats.org/officeDocument/2006/relationships" xmlns:p="http://schemas.openxmlformats.org/presentationml/2006/main">
   <p:cSld>
     <p:spTree>
@@ -45230,7 +45784,7 @@
             <a:fld id="{2E430B67-9B8D-45F2-8BD0-7EEC5CABEC81}" type="slidenum">
               <a:rPr lang="de-DE" smtClean="0"/>
               <a:pPr/>
-              <a:t>46</a:t>
+              <a:t>48</a:t>
             </a:fld>
             <a:endParaRPr lang="de-DE"/>
           </a:p>
@@ -45383,7 +45937,7 @@
 </p:sld>
 </file>
 
-<file path=ppt/slides/slide47.xml><?xml version="1.0" encoding="utf-8"?>
+<file path=ppt/slides/slide49.xml><?xml version="1.0" encoding="utf-8"?>
 <p:sld xmlns:a="http://schemas.openxmlformats.org/drawingml/2006/main" xmlns:r="http://schemas.openxmlformats.org/officeDocument/2006/relationships" xmlns:p="http://schemas.openxmlformats.org/presentationml/2006/main">
   <p:cSld>
     <p:spTree>
@@ -45418,7 +45972,7 @@
             <a:fld id="{2E430B67-9B8D-45F2-8BD0-7EEC5CABEC81}" type="slidenum">
               <a:rPr lang="de-DE" smtClean="0"/>
               <a:pPr/>
-              <a:t>47</a:t>
+              <a:t>49</a:t>
             </a:fld>
             <a:endParaRPr lang="de-DE"/>
           </a:p>
@@ -45581,158 +46135,6 @@
     <p:extLst>
       <p:ext uri="{BB962C8B-B14F-4D97-AF65-F5344CB8AC3E}">
         <p14:creationId xmlns:p14="http://schemas.microsoft.com/office/powerpoint/2010/main" val="44214041"/>
-      </p:ext>
-    </p:extLst>
-  </p:cSld>
-  <p:clrMapOvr>
-    <a:masterClrMapping/>
-  </p:clrMapOvr>
-  <p:transition/>
-</p:sld>
-</file>
-
-<file path=ppt/slides/slide48.xml><?xml version="1.0" encoding="utf-8"?>
-<p:sld xmlns:a="http://schemas.openxmlformats.org/drawingml/2006/main" xmlns:r="http://schemas.openxmlformats.org/officeDocument/2006/relationships" xmlns:p="http://schemas.openxmlformats.org/presentationml/2006/main">
-  <p:cSld>
-    <p:spTree>
-      <p:nvGrpSpPr>
-        <p:cNvPr id="1" name=""/>
-        <p:cNvGrpSpPr/>
-        <p:nvPr/>
-      </p:nvGrpSpPr>
-      <p:grpSpPr>
-        <a:xfrm>
-          <a:off x="0" y="0"/>
-          <a:ext cx="0" cy="0"/>
-          <a:chOff x="0" y="0"/>
-          <a:chExt cx="0" cy="0"/>
-        </a:xfrm>
-      </p:grpSpPr>
-      <p:sp>
-        <p:nvSpPr>
-          <p:cNvPr id="2" name="Foliennummernplatzhalter 1"/>
-          <p:cNvSpPr>
-            <a:spLocks noGrp="1"/>
-          </p:cNvSpPr>
-          <p:nvPr>
-            <p:ph type="sldNum" sz="quarter" idx="13"/>
-          </p:nvPr>
-        </p:nvSpPr>
-        <p:spPr/>
-        <p:txBody>
-          <a:bodyPr/>
-          <a:lstStyle/>
-          <a:p>
-            <a:fld id="{2E430B67-9B8D-45F2-8BD0-7EEC5CABEC81}" type="slidenum">
-              <a:rPr lang="de-DE" smtClean="0"/>
-              <a:pPr/>
-              <a:t>48</a:t>
-            </a:fld>
-            <a:endParaRPr lang="de-DE"/>
-          </a:p>
-        </p:txBody>
-      </p:sp>
-      <p:sp>
-        <p:nvSpPr>
-          <p:cNvPr id="3" name="Textplatzhalter 2"/>
-          <p:cNvSpPr>
-            <a:spLocks noGrp="1"/>
-          </p:cNvSpPr>
-          <p:nvPr>
-            <p:ph type="body" sz="quarter" idx="17"/>
-          </p:nvPr>
-        </p:nvSpPr>
-        <p:spPr/>
-        <p:txBody>
-          <a:bodyPr/>
-          <a:lstStyle/>
-          <a:p>
-            <a:pPr marL="285750" indent="-285750">
-              <a:buFontTx/>
-              <a:buChar char="-"/>
-            </a:pPr>
-            <a:r>
-              <a:rPr lang="de-DE" dirty="0"/>
-              <a:t>Ein Konflikt entsteht, wenn die beiden Änderungen von Harry und Sally kollidieren, also z.B. den gleichen Bereich eines Dokuments betreffen</a:t>
-            </a:r>
-          </a:p>
-          <a:p>
-            <a:pPr marL="285750" indent="-285750">
-              <a:buFontTx/>
-              <a:buChar char="-"/>
-            </a:pPr>
-            <a:r>
-              <a:rPr lang="de-DE" dirty="0"/>
-              <a:t>Die kollidierenden Änderungen werden vom System gekennzeichnet</a:t>
-            </a:r>
-          </a:p>
-          <a:p>
-            <a:pPr marL="285750" indent="-285750">
-              <a:buFontTx/>
-              <a:buChar char="-"/>
-            </a:pPr>
-            <a:r>
-              <a:rPr lang="de-DE" dirty="0"/>
-              <a:t>Nun ist es an den Menschen, diesen Konflikt z.B. in Absprache mit dem jeweils anderen Bearbeiter zu lösen</a:t>
-            </a:r>
-          </a:p>
-          <a:p>
-            <a:pPr marL="285750" indent="-285750">
-              <a:buFontTx/>
-              <a:buChar char="-"/>
-            </a:pPr>
-            <a:endParaRPr lang="de-DE" dirty="0"/>
-          </a:p>
-        </p:txBody>
-      </p:sp>
-      <p:sp>
-        <p:nvSpPr>
-          <p:cNvPr id="4" name="Textplatzhalter 3"/>
-          <p:cNvSpPr>
-            <a:spLocks noGrp="1"/>
-          </p:cNvSpPr>
-          <p:nvPr>
-            <p:ph type="body" sz="quarter" idx="11"/>
-          </p:nvPr>
-        </p:nvSpPr>
-        <p:spPr/>
-        <p:txBody>
-          <a:bodyPr/>
-          <a:lstStyle/>
-          <a:p>
-            <a:r>
-              <a:rPr lang="de-DE" dirty="0"/>
-              <a:t>Konflikte</a:t>
-            </a:r>
-          </a:p>
-        </p:txBody>
-      </p:sp>
-      <p:sp>
-        <p:nvSpPr>
-          <p:cNvPr id="5" name="Titel 4"/>
-          <p:cNvSpPr>
-            <a:spLocks noGrp="1"/>
-          </p:cNvSpPr>
-          <p:nvPr>
-            <p:ph type="title"/>
-          </p:nvPr>
-        </p:nvSpPr>
-        <p:spPr/>
-        <p:txBody>
-          <a:bodyPr/>
-          <a:lstStyle/>
-          <a:p>
-            <a:r>
-              <a:rPr lang="de-DE" dirty="0"/>
-              <a:t>Das Problem verteilter Dateizugriffe</a:t>
-            </a:r>
-          </a:p>
-        </p:txBody>
-      </p:sp>
-    </p:spTree>
-    <p:extLst>
-      <p:ext uri="{BB962C8B-B14F-4D97-AF65-F5344CB8AC3E}">
-        <p14:creationId xmlns:p14="http://schemas.microsoft.com/office/powerpoint/2010/main" val="2088883735"/>
       </p:ext>
     </p:extLst>
   </p:cSld>
@@ -45880,6 +46282,158 @@
     <p:extLst>
       <p:ext uri="{BB962C8B-B14F-4D97-AF65-F5344CB8AC3E}">
         <p14:creationId xmlns:p14="http://schemas.microsoft.com/office/powerpoint/2010/main" val="1425939324"/>
+      </p:ext>
+    </p:extLst>
+  </p:cSld>
+  <p:clrMapOvr>
+    <a:masterClrMapping/>
+  </p:clrMapOvr>
+  <p:transition/>
+</p:sld>
+</file>
+
+<file path=ppt/slides/slide50.xml><?xml version="1.0" encoding="utf-8"?>
+<p:sld xmlns:a="http://schemas.openxmlformats.org/drawingml/2006/main" xmlns:r="http://schemas.openxmlformats.org/officeDocument/2006/relationships" xmlns:p="http://schemas.openxmlformats.org/presentationml/2006/main">
+  <p:cSld>
+    <p:spTree>
+      <p:nvGrpSpPr>
+        <p:cNvPr id="1" name=""/>
+        <p:cNvGrpSpPr/>
+        <p:nvPr/>
+      </p:nvGrpSpPr>
+      <p:grpSpPr>
+        <a:xfrm>
+          <a:off x="0" y="0"/>
+          <a:ext cx="0" cy="0"/>
+          <a:chOff x="0" y="0"/>
+          <a:chExt cx="0" cy="0"/>
+        </a:xfrm>
+      </p:grpSpPr>
+      <p:sp>
+        <p:nvSpPr>
+          <p:cNvPr id="2" name="Foliennummernplatzhalter 1"/>
+          <p:cNvSpPr>
+            <a:spLocks noGrp="1"/>
+          </p:cNvSpPr>
+          <p:nvPr>
+            <p:ph type="sldNum" sz="quarter" idx="13"/>
+          </p:nvPr>
+        </p:nvSpPr>
+        <p:spPr/>
+        <p:txBody>
+          <a:bodyPr/>
+          <a:lstStyle/>
+          <a:p>
+            <a:fld id="{2E430B67-9B8D-45F2-8BD0-7EEC5CABEC81}" type="slidenum">
+              <a:rPr lang="de-DE" smtClean="0"/>
+              <a:pPr/>
+              <a:t>50</a:t>
+            </a:fld>
+            <a:endParaRPr lang="de-DE"/>
+          </a:p>
+        </p:txBody>
+      </p:sp>
+      <p:sp>
+        <p:nvSpPr>
+          <p:cNvPr id="3" name="Textplatzhalter 2"/>
+          <p:cNvSpPr>
+            <a:spLocks noGrp="1"/>
+          </p:cNvSpPr>
+          <p:nvPr>
+            <p:ph type="body" sz="quarter" idx="17"/>
+          </p:nvPr>
+        </p:nvSpPr>
+        <p:spPr/>
+        <p:txBody>
+          <a:bodyPr/>
+          <a:lstStyle/>
+          <a:p>
+            <a:pPr marL="285750" indent="-285750">
+              <a:buFontTx/>
+              <a:buChar char="-"/>
+            </a:pPr>
+            <a:r>
+              <a:rPr lang="de-DE" dirty="0"/>
+              <a:t>Ein Konflikt entsteht, wenn die beiden Änderungen von Harry und Sally kollidieren, also z.B. den gleichen Bereich eines Dokuments betreffen</a:t>
+            </a:r>
+          </a:p>
+          <a:p>
+            <a:pPr marL="285750" indent="-285750">
+              <a:buFontTx/>
+              <a:buChar char="-"/>
+            </a:pPr>
+            <a:r>
+              <a:rPr lang="de-DE" dirty="0"/>
+              <a:t>Die kollidierenden Änderungen werden vom System gekennzeichnet</a:t>
+            </a:r>
+          </a:p>
+          <a:p>
+            <a:pPr marL="285750" indent="-285750">
+              <a:buFontTx/>
+              <a:buChar char="-"/>
+            </a:pPr>
+            <a:r>
+              <a:rPr lang="de-DE" dirty="0"/>
+              <a:t>Nun ist es an den Menschen, diesen Konflikt z.B. in Absprache mit dem jeweils anderen Bearbeiter zu lösen</a:t>
+            </a:r>
+          </a:p>
+          <a:p>
+            <a:pPr marL="285750" indent="-285750">
+              <a:buFontTx/>
+              <a:buChar char="-"/>
+            </a:pPr>
+            <a:endParaRPr lang="de-DE" dirty="0"/>
+          </a:p>
+        </p:txBody>
+      </p:sp>
+      <p:sp>
+        <p:nvSpPr>
+          <p:cNvPr id="4" name="Textplatzhalter 3"/>
+          <p:cNvSpPr>
+            <a:spLocks noGrp="1"/>
+          </p:cNvSpPr>
+          <p:nvPr>
+            <p:ph type="body" sz="quarter" idx="11"/>
+          </p:nvPr>
+        </p:nvSpPr>
+        <p:spPr/>
+        <p:txBody>
+          <a:bodyPr/>
+          <a:lstStyle/>
+          <a:p>
+            <a:r>
+              <a:rPr lang="de-DE" dirty="0"/>
+              <a:t>Konflikte</a:t>
+            </a:r>
+          </a:p>
+        </p:txBody>
+      </p:sp>
+      <p:sp>
+        <p:nvSpPr>
+          <p:cNvPr id="5" name="Titel 4"/>
+          <p:cNvSpPr>
+            <a:spLocks noGrp="1"/>
+          </p:cNvSpPr>
+          <p:nvPr>
+            <p:ph type="title"/>
+          </p:nvPr>
+        </p:nvSpPr>
+        <p:spPr/>
+        <p:txBody>
+          <a:bodyPr/>
+          <a:lstStyle/>
+          <a:p>
+            <a:r>
+              <a:rPr lang="de-DE" dirty="0"/>
+              <a:t>Das Problem verteilter Dateizugriffe</a:t>
+            </a:r>
+          </a:p>
+        </p:txBody>
+      </p:sp>
+    </p:spTree>
+    <p:extLst>
+      <p:ext uri="{BB962C8B-B14F-4D97-AF65-F5344CB8AC3E}">
+        <p14:creationId xmlns:p14="http://schemas.microsoft.com/office/powerpoint/2010/main" val="2088883735"/>
       </p:ext>
     </p:extLst>
   </p:cSld>

</xml_diff>